<commit_message>
recent cosmetic updates to background/foreground functions
</commit_message>
<xml_diff>
--- a/Data/DFT2025/TheoryExperComparison.pptx
+++ b/Data/DFT2025/TheoryExperComparison.pptx
@@ -105,6 +105,11 @@
       </a:defRPr>
     </a:lvl9pPr>
   </p:defaultTextStyle>
+  <p:extLst>
+    <p:ext uri="{EFAFB233-063F-42B5-8137-9DF3F51BA10A}">
+      <p15:sldGuideLst xmlns:p15="http://schemas.microsoft.com/office/powerpoint/2012/main"/>
+    </p:ext>
+  </p:extLst>
 </p:presentation>
 </file>
 
@@ -257,7 +262,7 @@
           <a:p>
             <a:fld id="{CCA5D086-41C3-45A3-9AA5-B506825A19E0}" type="datetimeFigureOut">
               <a:rPr lang="en-GB" smtClean="0"/>
-              <a:t>08/07/2025</a:t>
+              <a:t>11/07/2025</a:t>
             </a:fld>
             <a:endParaRPr lang="en-GB"/>
           </a:p>
@@ -457,7 +462,7 @@
           <a:p>
             <a:fld id="{CCA5D086-41C3-45A3-9AA5-B506825A19E0}" type="datetimeFigureOut">
               <a:rPr lang="en-GB" smtClean="0"/>
-              <a:t>08/07/2025</a:t>
+              <a:t>11/07/2025</a:t>
             </a:fld>
             <a:endParaRPr lang="en-GB"/>
           </a:p>
@@ -667,7 +672,7 @@
           <a:p>
             <a:fld id="{CCA5D086-41C3-45A3-9AA5-B506825A19E0}" type="datetimeFigureOut">
               <a:rPr lang="en-GB" smtClean="0"/>
-              <a:t>08/07/2025</a:t>
+              <a:t>11/07/2025</a:t>
             </a:fld>
             <a:endParaRPr lang="en-GB"/>
           </a:p>
@@ -867,7 +872,7 @@
           <a:p>
             <a:fld id="{CCA5D086-41C3-45A3-9AA5-B506825A19E0}" type="datetimeFigureOut">
               <a:rPr lang="en-GB" smtClean="0"/>
-              <a:t>08/07/2025</a:t>
+              <a:t>11/07/2025</a:t>
             </a:fld>
             <a:endParaRPr lang="en-GB"/>
           </a:p>
@@ -1143,7 +1148,7 @@
           <a:p>
             <a:fld id="{CCA5D086-41C3-45A3-9AA5-B506825A19E0}" type="datetimeFigureOut">
               <a:rPr lang="en-GB" smtClean="0"/>
-              <a:t>08/07/2025</a:t>
+              <a:t>11/07/2025</a:t>
             </a:fld>
             <a:endParaRPr lang="en-GB"/>
           </a:p>
@@ -1411,7 +1416,7 @@
           <a:p>
             <a:fld id="{CCA5D086-41C3-45A3-9AA5-B506825A19E0}" type="datetimeFigureOut">
               <a:rPr lang="en-GB" smtClean="0"/>
-              <a:t>08/07/2025</a:t>
+              <a:t>11/07/2025</a:t>
             </a:fld>
             <a:endParaRPr lang="en-GB"/>
           </a:p>
@@ -1826,7 +1831,7 @@
           <a:p>
             <a:fld id="{CCA5D086-41C3-45A3-9AA5-B506825A19E0}" type="datetimeFigureOut">
               <a:rPr lang="en-GB" smtClean="0"/>
-              <a:t>08/07/2025</a:t>
+              <a:t>11/07/2025</a:t>
             </a:fld>
             <a:endParaRPr lang="en-GB"/>
           </a:p>
@@ -1968,7 +1973,7 @@
           <a:p>
             <a:fld id="{CCA5D086-41C3-45A3-9AA5-B506825A19E0}" type="datetimeFigureOut">
               <a:rPr lang="en-GB" smtClean="0"/>
-              <a:t>08/07/2025</a:t>
+              <a:t>11/07/2025</a:t>
             </a:fld>
             <a:endParaRPr lang="en-GB"/>
           </a:p>
@@ -2081,7 +2086,7 @@
           <a:p>
             <a:fld id="{CCA5D086-41C3-45A3-9AA5-B506825A19E0}" type="datetimeFigureOut">
               <a:rPr lang="en-GB" smtClean="0"/>
-              <a:t>08/07/2025</a:t>
+              <a:t>11/07/2025</a:t>
             </a:fld>
             <a:endParaRPr lang="en-GB"/>
           </a:p>
@@ -2394,7 +2399,7 @@
           <a:p>
             <a:fld id="{CCA5D086-41C3-45A3-9AA5-B506825A19E0}" type="datetimeFigureOut">
               <a:rPr lang="en-GB" smtClean="0"/>
-              <a:t>08/07/2025</a:t>
+              <a:t>11/07/2025</a:t>
             </a:fld>
             <a:endParaRPr lang="en-GB"/>
           </a:p>
@@ -2683,7 +2688,7 @@
           <a:p>
             <a:fld id="{CCA5D086-41C3-45A3-9AA5-B506825A19E0}" type="datetimeFigureOut">
               <a:rPr lang="en-GB" smtClean="0"/>
-              <a:t>08/07/2025</a:t>
+              <a:t>11/07/2025</a:t>
             </a:fld>
             <a:endParaRPr lang="en-GB"/>
           </a:p>
@@ -2926,7 +2931,7 @@
           <a:p>
             <a:fld id="{CCA5D086-41C3-45A3-9AA5-B506825A19E0}" type="datetimeFigureOut">
               <a:rPr lang="en-GB" smtClean="0"/>
-              <a:t>08/07/2025</a:t>
+              <a:t>11/07/2025</a:t>
             </a:fld>
             <a:endParaRPr lang="en-GB"/>
           </a:p>
@@ -3462,8 +3467,8 @@
           </a:prstGeom>
         </p:spPr>
       </p:pic>
-      <mc:AlternateContent xmlns:mc="http://schemas.openxmlformats.org/markup-compatibility/2006">
-        <mc:Choice xmlns:a14="http://schemas.microsoft.com/office/drawing/2010/main" Requires="a14">
+      <mc:AlternateContent xmlns:mc="http://schemas.openxmlformats.org/markup-compatibility/2006" xmlns:a14="http://schemas.microsoft.com/office/drawing/2010/main">
+        <mc:Choice Requires="a14">
           <p:sp>
             <p:nvSpPr>
               <p:cNvPr id="17" name="TextBox 16">
@@ -3492,6 +3497,7 @@
               </a:bodyPr>
               <a:lstStyle/>
               <a:p>
+                <a:pPr/>
                 <a14:m>
                   <m:oMathPara xmlns:m="http://schemas.openxmlformats.org/officeDocument/2006/math">
                     <m:oMathParaPr>
@@ -3625,7 +3631,7 @@
             </p:txBody>
           </p:sp>
         </mc:Choice>
-        <mc:Fallback>
+        <mc:Fallback xmlns="">
           <p:sp>
             <p:nvSpPr>
               <p:cNvPr id="17" name="TextBox 16">
@@ -3751,8 +3757,8 @@
           </a:p>
         </p:txBody>
       </p:sp>
-      <mc:AlternateContent xmlns:mc="http://schemas.openxmlformats.org/markup-compatibility/2006">
-        <mc:Choice xmlns:a14="http://schemas.microsoft.com/office/drawing/2010/main" Requires="a14">
+      <mc:AlternateContent xmlns:mc="http://schemas.openxmlformats.org/markup-compatibility/2006" xmlns:a14="http://schemas.microsoft.com/office/drawing/2010/main">
+        <mc:Choice Requires="a14">
           <p:sp>
             <p:nvSpPr>
               <p:cNvPr id="22" name="TextBox 21">
@@ -3781,6 +3787,7 @@
               </a:bodyPr>
               <a:lstStyle/>
               <a:p>
+                <a:pPr/>
                 <a14:m>
                   <m:oMathPara xmlns:m="http://schemas.openxmlformats.org/officeDocument/2006/math">
                     <m:oMathParaPr>
@@ -3809,7 +3816,7 @@
             </p:txBody>
           </p:sp>
         </mc:Choice>
-        <mc:Fallback>
+        <mc:Fallback xmlns="">
           <p:sp>
             <p:nvSpPr>
               <p:cNvPr id="22" name="TextBox 21">

</xml_diff>

<commit_message>
last modifications to Fe article and scripts to read recent DFT data
</commit_message>
<xml_diff>
--- a/Data/DFT2025/TheoryExperComparison.pptx
+++ b/Data/DFT2025/TheoryExperComparison.pptx
@@ -7,6 +7,8 @@
   <p:sldIdLst>
     <p:sldId id="256" r:id="rId2"/>
     <p:sldId id="257" r:id="rId3"/>
+    <p:sldId id="258" r:id="rId4"/>
+    <p:sldId id="259" r:id="rId5"/>
   </p:sldIdLst>
   <p:sldSz cx="12192000" cy="6858000"/>
   <p:notesSz cx="6858000" cy="9144000"/>
@@ -262,7 +264,7 @@
           <a:p>
             <a:fld id="{CCA5D086-41C3-45A3-9AA5-B506825A19E0}" type="datetimeFigureOut">
               <a:rPr lang="en-GB" smtClean="0"/>
-              <a:t>11/07/2025</a:t>
+              <a:t>01/10/2025</a:t>
             </a:fld>
             <a:endParaRPr lang="en-GB"/>
           </a:p>
@@ -462,7 +464,7 @@
           <a:p>
             <a:fld id="{CCA5D086-41C3-45A3-9AA5-B506825A19E0}" type="datetimeFigureOut">
               <a:rPr lang="en-GB" smtClean="0"/>
-              <a:t>11/07/2025</a:t>
+              <a:t>01/10/2025</a:t>
             </a:fld>
             <a:endParaRPr lang="en-GB"/>
           </a:p>
@@ -672,7 +674,7 @@
           <a:p>
             <a:fld id="{CCA5D086-41C3-45A3-9AA5-B506825A19E0}" type="datetimeFigureOut">
               <a:rPr lang="en-GB" smtClean="0"/>
-              <a:t>11/07/2025</a:t>
+              <a:t>01/10/2025</a:t>
             </a:fld>
             <a:endParaRPr lang="en-GB"/>
           </a:p>
@@ -872,7 +874,7 @@
           <a:p>
             <a:fld id="{CCA5D086-41C3-45A3-9AA5-B506825A19E0}" type="datetimeFigureOut">
               <a:rPr lang="en-GB" smtClean="0"/>
-              <a:t>11/07/2025</a:t>
+              <a:t>01/10/2025</a:t>
             </a:fld>
             <a:endParaRPr lang="en-GB"/>
           </a:p>
@@ -1148,7 +1150,7 @@
           <a:p>
             <a:fld id="{CCA5D086-41C3-45A3-9AA5-B506825A19E0}" type="datetimeFigureOut">
               <a:rPr lang="en-GB" smtClean="0"/>
-              <a:t>11/07/2025</a:t>
+              <a:t>01/10/2025</a:t>
             </a:fld>
             <a:endParaRPr lang="en-GB"/>
           </a:p>
@@ -1416,7 +1418,7 @@
           <a:p>
             <a:fld id="{CCA5D086-41C3-45A3-9AA5-B506825A19E0}" type="datetimeFigureOut">
               <a:rPr lang="en-GB" smtClean="0"/>
-              <a:t>11/07/2025</a:t>
+              <a:t>01/10/2025</a:t>
             </a:fld>
             <a:endParaRPr lang="en-GB"/>
           </a:p>
@@ -1831,7 +1833,7 @@
           <a:p>
             <a:fld id="{CCA5D086-41C3-45A3-9AA5-B506825A19E0}" type="datetimeFigureOut">
               <a:rPr lang="en-GB" smtClean="0"/>
-              <a:t>11/07/2025</a:t>
+              <a:t>01/10/2025</a:t>
             </a:fld>
             <a:endParaRPr lang="en-GB"/>
           </a:p>
@@ -1973,7 +1975,7 @@
           <a:p>
             <a:fld id="{CCA5D086-41C3-45A3-9AA5-B506825A19E0}" type="datetimeFigureOut">
               <a:rPr lang="en-GB" smtClean="0"/>
-              <a:t>11/07/2025</a:t>
+              <a:t>01/10/2025</a:t>
             </a:fld>
             <a:endParaRPr lang="en-GB"/>
           </a:p>
@@ -2086,7 +2088,7 @@
           <a:p>
             <a:fld id="{CCA5D086-41C3-45A3-9AA5-B506825A19E0}" type="datetimeFigureOut">
               <a:rPr lang="en-GB" smtClean="0"/>
-              <a:t>11/07/2025</a:t>
+              <a:t>01/10/2025</a:t>
             </a:fld>
             <a:endParaRPr lang="en-GB"/>
           </a:p>
@@ -2399,7 +2401,7 @@
           <a:p>
             <a:fld id="{CCA5D086-41C3-45A3-9AA5-B506825A19E0}" type="datetimeFigureOut">
               <a:rPr lang="en-GB" smtClean="0"/>
-              <a:t>11/07/2025</a:t>
+              <a:t>01/10/2025</a:t>
             </a:fld>
             <a:endParaRPr lang="en-GB"/>
           </a:p>
@@ -2688,7 +2690,7 @@
           <a:p>
             <a:fld id="{CCA5D086-41C3-45A3-9AA5-B506825A19E0}" type="datetimeFigureOut">
               <a:rPr lang="en-GB" smtClean="0"/>
-              <a:t>11/07/2025</a:t>
+              <a:t>01/10/2025</a:t>
             </a:fld>
             <a:endParaRPr lang="en-GB"/>
           </a:p>
@@ -2931,7 +2933,7 @@
           <a:p>
             <a:fld id="{CCA5D086-41C3-45A3-9AA5-B506825A19E0}" type="datetimeFigureOut">
               <a:rPr lang="en-GB" smtClean="0"/>
-              <a:t>11/07/2025</a:t>
+              <a:t>01/10/2025</a:t>
             </a:fld>
             <a:endParaRPr lang="en-GB"/>
           </a:p>
@@ -4214,6 +4216,442 @@
 </p:sld>
 </file>
 
+<file path=ppt/slides/slide3.xml><?xml version="1.0" encoding="utf-8"?>
+<p:sld xmlns:a="http://schemas.openxmlformats.org/drawingml/2006/main" xmlns:r="http://schemas.openxmlformats.org/officeDocument/2006/relationships" xmlns:p="http://schemas.openxmlformats.org/presentationml/2006/main">
+  <p:cSld>
+    <p:spTree>
+      <p:nvGrpSpPr>
+        <p:cNvPr id="1" name=""/>
+        <p:cNvGrpSpPr/>
+        <p:nvPr/>
+      </p:nvGrpSpPr>
+      <p:grpSpPr>
+        <a:xfrm>
+          <a:off x="0" y="0"/>
+          <a:ext cx="0" cy="0"/>
+          <a:chOff x="0" y="0"/>
+          <a:chExt cx="0" cy="0"/>
+        </a:xfrm>
+      </p:grpSpPr>
+      <p:sp>
+        <p:nvSpPr>
+          <p:cNvPr id="2" name="TextBox 1">
+            <a:extLst>
+              <a:ext uri="{FF2B5EF4-FFF2-40B4-BE49-F238E27FC236}">
+                <a16:creationId xmlns:a16="http://schemas.microsoft.com/office/drawing/2014/main" id="{E14D5EB8-C6DF-E9B3-9A2E-DB776BCADABE}"/>
+              </a:ext>
+            </a:extLst>
+          </p:cNvPr>
+          <p:cNvSpPr txBox="1"/>
+          <p:nvPr/>
+        </p:nvSpPr>
+        <p:spPr>
+          <a:xfrm>
+            <a:off x="609599" y="293511"/>
+            <a:ext cx="5779911" cy="369332"/>
+          </a:xfrm>
+          <a:prstGeom prst="rect">
+            <a:avLst/>
+          </a:prstGeom>
+          <a:noFill/>
+        </p:spPr>
+        <p:txBody>
+          <a:bodyPr wrap="square" rtlCol="0">
+            <a:spAutoFit/>
+          </a:bodyPr>
+          <a:lstStyle/>
+          <a:p>
+            <a:r>
+              <a:rPr lang="en-GB" dirty="0"/>
+              <a:t>LDA</a:t>
+            </a:r>
+          </a:p>
+        </p:txBody>
+      </p:sp>
+      <p:pic>
+        <p:nvPicPr>
+          <p:cNvPr id="4" name="Picture 3">
+            <a:extLst>
+              <a:ext uri="{FF2B5EF4-FFF2-40B4-BE49-F238E27FC236}">
+                <a16:creationId xmlns:a16="http://schemas.microsoft.com/office/drawing/2014/main" id="{0D62FA8A-4A23-D441-7D31-5F7D03291E47}"/>
+              </a:ext>
+            </a:extLst>
+          </p:cNvPr>
+          <p:cNvPicPr>
+            <a:picLocks noChangeAspect="1"/>
+          </p:cNvPicPr>
+          <p:nvPr/>
+        </p:nvPicPr>
+        <p:blipFill>
+          <a:blip r:embed="rId2"/>
+          <a:stretch>
+            <a:fillRect/>
+          </a:stretch>
+        </p:blipFill>
+        <p:spPr>
+          <a:xfrm>
+            <a:off x="4586899" y="319366"/>
+            <a:ext cx="4080850" cy="3060638"/>
+          </a:xfrm>
+          <a:prstGeom prst="rect">
+            <a:avLst/>
+          </a:prstGeom>
+        </p:spPr>
+      </p:pic>
+      <p:pic>
+        <p:nvPicPr>
+          <p:cNvPr id="6" name="Picture 5">
+            <a:extLst>
+              <a:ext uri="{FF2B5EF4-FFF2-40B4-BE49-F238E27FC236}">
+                <a16:creationId xmlns:a16="http://schemas.microsoft.com/office/drawing/2014/main" id="{4BF90D9D-86CA-5E27-D870-335B5926D73E}"/>
+              </a:ext>
+            </a:extLst>
+          </p:cNvPr>
+          <p:cNvPicPr>
+            <a:picLocks noChangeAspect="1"/>
+          </p:cNvPicPr>
+          <p:nvPr/>
+        </p:nvPicPr>
+        <p:blipFill>
+          <a:blip r:embed="rId3"/>
+          <a:stretch>
+            <a:fillRect/>
+          </a:stretch>
+        </p:blipFill>
+        <p:spPr>
+          <a:xfrm>
+            <a:off x="1227667" y="662843"/>
+            <a:ext cx="3507317" cy="2630488"/>
+          </a:xfrm>
+          <a:prstGeom prst="rect">
+            <a:avLst/>
+          </a:prstGeom>
+        </p:spPr>
+      </p:pic>
+      <p:pic>
+        <p:nvPicPr>
+          <p:cNvPr id="8" name="Picture 7">
+            <a:extLst>
+              <a:ext uri="{FF2B5EF4-FFF2-40B4-BE49-F238E27FC236}">
+                <a16:creationId xmlns:a16="http://schemas.microsoft.com/office/drawing/2014/main" id="{DFFA87A0-C6E2-84E6-992F-38B4F95EE4FC}"/>
+              </a:ext>
+            </a:extLst>
+          </p:cNvPr>
+          <p:cNvPicPr>
+            <a:picLocks noChangeAspect="1"/>
+          </p:cNvPicPr>
+          <p:nvPr/>
+        </p:nvPicPr>
+        <p:blipFill>
+          <a:blip r:embed="rId4"/>
+          <a:stretch>
+            <a:fillRect/>
+          </a:stretch>
+        </p:blipFill>
+        <p:spPr>
+          <a:xfrm>
+            <a:off x="1227667" y="3662663"/>
+            <a:ext cx="3507317" cy="2630488"/>
+          </a:xfrm>
+          <a:prstGeom prst="rect">
+            <a:avLst/>
+          </a:prstGeom>
+        </p:spPr>
+      </p:pic>
+      <p:pic>
+        <p:nvPicPr>
+          <p:cNvPr id="10" name="Picture 9">
+            <a:extLst>
+              <a:ext uri="{FF2B5EF4-FFF2-40B4-BE49-F238E27FC236}">
+                <a16:creationId xmlns:a16="http://schemas.microsoft.com/office/drawing/2014/main" id="{AFC71321-BF98-2045-A96E-DD9712E32B89}"/>
+              </a:ext>
+            </a:extLst>
+          </p:cNvPr>
+          <p:cNvPicPr>
+            <a:picLocks noChangeAspect="1"/>
+          </p:cNvPicPr>
+          <p:nvPr/>
+        </p:nvPicPr>
+        <p:blipFill>
+          <a:blip r:embed="rId5"/>
+          <a:stretch>
+            <a:fillRect/>
+          </a:stretch>
+        </p:blipFill>
+        <p:spPr>
+          <a:xfrm>
+            <a:off x="4716015" y="3571020"/>
+            <a:ext cx="4080851" cy="3060638"/>
+          </a:xfrm>
+          <a:prstGeom prst="rect">
+            <a:avLst/>
+          </a:prstGeom>
+        </p:spPr>
+      </p:pic>
+      <p:pic>
+        <p:nvPicPr>
+          <p:cNvPr id="12" name="Picture 11">
+            <a:extLst>
+              <a:ext uri="{FF2B5EF4-FFF2-40B4-BE49-F238E27FC236}">
+                <a16:creationId xmlns:a16="http://schemas.microsoft.com/office/drawing/2014/main" id="{FFB242D4-581A-7DEE-BE1E-A459DD3BCDC8}"/>
+              </a:ext>
+            </a:extLst>
+          </p:cNvPr>
+          <p:cNvPicPr>
+            <a:picLocks noChangeAspect="1"/>
+          </p:cNvPicPr>
+          <p:nvPr/>
+        </p:nvPicPr>
+        <p:blipFill>
+          <a:blip r:embed="rId6"/>
+          <a:stretch>
+            <a:fillRect/>
+          </a:stretch>
+        </p:blipFill>
+        <p:spPr>
+          <a:xfrm>
+            <a:off x="8365067" y="3571020"/>
+            <a:ext cx="3826933" cy="2870200"/>
+          </a:xfrm>
+          <a:prstGeom prst="rect">
+            <a:avLst/>
+          </a:prstGeom>
+        </p:spPr>
+      </p:pic>
+    </p:spTree>
+    <p:extLst>
+      <p:ext uri="{BB962C8B-B14F-4D97-AF65-F5344CB8AC3E}">
+        <p14:creationId xmlns:p14="http://schemas.microsoft.com/office/powerpoint/2010/main" val="235362828"/>
+      </p:ext>
+    </p:extLst>
+  </p:cSld>
+  <p:clrMapOvr>
+    <a:masterClrMapping/>
+  </p:clrMapOvr>
+</p:sld>
+</file>
+
+<file path=ppt/slides/slide4.xml><?xml version="1.0" encoding="utf-8"?>
+<p:sld xmlns:a="http://schemas.openxmlformats.org/drawingml/2006/main" xmlns:r="http://schemas.openxmlformats.org/officeDocument/2006/relationships" xmlns:p="http://schemas.openxmlformats.org/presentationml/2006/main">
+  <p:cSld>
+    <p:spTree>
+      <p:nvGrpSpPr>
+        <p:cNvPr id="1" name="">
+          <a:extLst>
+            <a:ext uri="{FF2B5EF4-FFF2-40B4-BE49-F238E27FC236}">
+              <a16:creationId xmlns:a16="http://schemas.microsoft.com/office/drawing/2014/main" id="{D44961C8-FAC3-0A66-A455-4A34C61A6071}"/>
+            </a:ext>
+          </a:extLst>
+        </p:cNvPr>
+        <p:cNvGrpSpPr/>
+        <p:nvPr/>
+      </p:nvGrpSpPr>
+      <p:grpSpPr>
+        <a:xfrm>
+          <a:off x="0" y="0"/>
+          <a:ext cx="0" cy="0"/>
+          <a:chOff x="0" y="0"/>
+          <a:chExt cx="0" cy="0"/>
+        </a:xfrm>
+      </p:grpSpPr>
+      <p:sp>
+        <p:nvSpPr>
+          <p:cNvPr id="2" name="TextBox 1">
+            <a:extLst>
+              <a:ext uri="{FF2B5EF4-FFF2-40B4-BE49-F238E27FC236}">
+                <a16:creationId xmlns:a16="http://schemas.microsoft.com/office/drawing/2014/main" id="{921FF745-91E8-67C9-7F91-0D6BC9086B0D}"/>
+              </a:ext>
+            </a:extLst>
+          </p:cNvPr>
+          <p:cNvSpPr txBox="1"/>
+          <p:nvPr/>
+        </p:nvSpPr>
+        <p:spPr>
+          <a:xfrm>
+            <a:off x="609599" y="293511"/>
+            <a:ext cx="5779911" cy="369332"/>
+          </a:xfrm>
+          <a:prstGeom prst="rect">
+            <a:avLst/>
+          </a:prstGeom>
+          <a:noFill/>
+        </p:spPr>
+        <p:txBody>
+          <a:bodyPr wrap="square" rtlCol="0">
+            <a:spAutoFit/>
+          </a:bodyPr>
+          <a:lstStyle/>
+          <a:p>
+            <a:r>
+              <a:rPr lang="en-GB" dirty="0"/>
+              <a:t>GSGW</a:t>
+            </a:r>
+          </a:p>
+        </p:txBody>
+      </p:sp>
+      <p:pic>
+        <p:nvPicPr>
+          <p:cNvPr id="4" name="Picture 3">
+            <a:extLst>
+              <a:ext uri="{FF2B5EF4-FFF2-40B4-BE49-F238E27FC236}">
+                <a16:creationId xmlns:a16="http://schemas.microsoft.com/office/drawing/2014/main" id="{E071EA15-A5BA-EB24-EB20-CD74C1780E0E}"/>
+              </a:ext>
+            </a:extLst>
+          </p:cNvPr>
+          <p:cNvPicPr>
+            <a:picLocks noChangeAspect="1"/>
+          </p:cNvPicPr>
+          <p:nvPr/>
+        </p:nvPicPr>
+        <p:blipFill>
+          <a:blip r:embed="rId2"/>
+          <a:stretch>
+            <a:fillRect/>
+          </a:stretch>
+        </p:blipFill>
+        <p:spPr>
+          <a:xfrm>
+            <a:off x="4716016" y="359879"/>
+            <a:ext cx="4080850" cy="3060638"/>
+          </a:xfrm>
+          <a:prstGeom prst="rect">
+            <a:avLst/>
+          </a:prstGeom>
+        </p:spPr>
+      </p:pic>
+      <p:pic>
+        <p:nvPicPr>
+          <p:cNvPr id="10" name="Picture 9">
+            <a:extLst>
+              <a:ext uri="{FF2B5EF4-FFF2-40B4-BE49-F238E27FC236}">
+                <a16:creationId xmlns:a16="http://schemas.microsoft.com/office/drawing/2014/main" id="{2D730BAD-7D58-F0BC-1681-4E2FB5999873}"/>
+              </a:ext>
+            </a:extLst>
+          </p:cNvPr>
+          <p:cNvPicPr>
+            <a:picLocks noChangeAspect="1"/>
+          </p:cNvPicPr>
+          <p:nvPr/>
+        </p:nvPicPr>
+        <p:blipFill>
+          <a:blip r:embed="rId3"/>
+          <a:stretch>
+            <a:fillRect/>
+          </a:stretch>
+        </p:blipFill>
+        <p:spPr>
+          <a:xfrm>
+            <a:off x="4716015" y="3571020"/>
+            <a:ext cx="4080851" cy="3060638"/>
+          </a:xfrm>
+          <a:prstGeom prst="rect">
+            <a:avLst/>
+          </a:prstGeom>
+        </p:spPr>
+      </p:pic>
+      <p:pic>
+        <p:nvPicPr>
+          <p:cNvPr id="12" name="Picture 11">
+            <a:extLst>
+              <a:ext uri="{FF2B5EF4-FFF2-40B4-BE49-F238E27FC236}">
+                <a16:creationId xmlns:a16="http://schemas.microsoft.com/office/drawing/2014/main" id="{2E269BFC-1CF2-D053-5351-D676324BC149}"/>
+              </a:ext>
+            </a:extLst>
+          </p:cNvPr>
+          <p:cNvPicPr>
+            <a:picLocks noChangeAspect="1"/>
+          </p:cNvPicPr>
+          <p:nvPr/>
+        </p:nvPicPr>
+        <p:blipFill>
+          <a:blip r:embed="rId4"/>
+          <a:stretch>
+            <a:fillRect/>
+          </a:stretch>
+        </p:blipFill>
+        <p:spPr>
+          <a:xfrm>
+            <a:off x="8365067" y="3571020"/>
+            <a:ext cx="3826933" cy="2870200"/>
+          </a:xfrm>
+          <a:prstGeom prst="rect">
+            <a:avLst/>
+          </a:prstGeom>
+        </p:spPr>
+      </p:pic>
+      <p:pic>
+        <p:nvPicPr>
+          <p:cNvPr id="5" name="Picture 4">
+            <a:extLst>
+              <a:ext uri="{FF2B5EF4-FFF2-40B4-BE49-F238E27FC236}">
+                <a16:creationId xmlns:a16="http://schemas.microsoft.com/office/drawing/2014/main" id="{DD97B197-87AF-FC6C-435C-BA9995BCF137}"/>
+              </a:ext>
+            </a:extLst>
+          </p:cNvPr>
+          <p:cNvPicPr>
+            <a:picLocks noChangeAspect="1"/>
+          </p:cNvPicPr>
+          <p:nvPr/>
+        </p:nvPicPr>
+        <p:blipFill>
+          <a:blip r:embed="rId5"/>
+          <a:stretch>
+            <a:fillRect/>
+          </a:stretch>
+        </p:blipFill>
+        <p:spPr>
+          <a:xfrm>
+            <a:off x="482600" y="745331"/>
+            <a:ext cx="3657600" cy="2743200"/>
+          </a:xfrm>
+          <a:prstGeom prst="rect">
+            <a:avLst/>
+          </a:prstGeom>
+        </p:spPr>
+      </p:pic>
+      <p:pic>
+        <p:nvPicPr>
+          <p:cNvPr id="9" name="Picture 8">
+            <a:extLst>
+              <a:ext uri="{FF2B5EF4-FFF2-40B4-BE49-F238E27FC236}">
+                <a16:creationId xmlns:a16="http://schemas.microsoft.com/office/drawing/2014/main" id="{6B2194D7-FCC9-8CFB-727A-847C42D1F553}"/>
+              </a:ext>
+            </a:extLst>
+          </p:cNvPr>
+          <p:cNvPicPr>
+            <a:picLocks noChangeAspect="1"/>
+          </p:cNvPicPr>
+          <p:nvPr/>
+        </p:nvPicPr>
+        <p:blipFill>
+          <a:blip r:embed="rId6"/>
+          <a:stretch>
+            <a:fillRect/>
+          </a:stretch>
+        </p:blipFill>
+        <p:spPr>
+          <a:xfrm>
+            <a:off x="482600" y="3712947"/>
+            <a:ext cx="3937000" cy="2952750"/>
+          </a:xfrm>
+          <a:prstGeom prst="rect">
+            <a:avLst/>
+          </a:prstGeom>
+        </p:spPr>
+      </p:pic>
+    </p:spTree>
+    <p:extLst>
+      <p:ext uri="{BB962C8B-B14F-4D97-AF65-F5344CB8AC3E}">
+        <p14:creationId xmlns:p14="http://schemas.microsoft.com/office/powerpoint/2010/main" val="3397179586"/>
+      </p:ext>
+    </p:extLst>
+  </p:cSld>
+  <p:clrMapOvr>
+    <a:masterClrMapping/>
+  </p:clrMapOvr>
+</p:sld>
+</file>
+
 <file path=ppt/theme/theme1.xml><?xml version="1.0" encoding="utf-8"?>
 <a:theme xmlns:a="http://schemas.openxmlformats.org/drawingml/2006/main" name="Office Theme">
   <a:themeElements>

</xml_diff>

<commit_message>
modified read_childa/chigsgw with presumably correct normalisation constant
</commit_message>
<xml_diff>
--- a/Data/DFT2025/TheoryExperComparison.pptx
+++ b/Data/DFT2025/TheoryExperComparison.pptx
@@ -264,7 +264,7 @@
           <a:p>
             <a:fld id="{CCA5D086-41C3-45A3-9AA5-B506825A19E0}" type="datetimeFigureOut">
               <a:rPr lang="en-GB" smtClean="0"/>
-              <a:t>01/10/2025</a:t>
+              <a:t>04/12/2025</a:t>
             </a:fld>
             <a:endParaRPr lang="en-GB"/>
           </a:p>
@@ -464,7 +464,7 @@
           <a:p>
             <a:fld id="{CCA5D086-41C3-45A3-9AA5-B506825A19E0}" type="datetimeFigureOut">
               <a:rPr lang="en-GB" smtClean="0"/>
-              <a:t>01/10/2025</a:t>
+              <a:t>04/12/2025</a:t>
             </a:fld>
             <a:endParaRPr lang="en-GB"/>
           </a:p>
@@ -674,7 +674,7 @@
           <a:p>
             <a:fld id="{CCA5D086-41C3-45A3-9AA5-B506825A19E0}" type="datetimeFigureOut">
               <a:rPr lang="en-GB" smtClean="0"/>
-              <a:t>01/10/2025</a:t>
+              <a:t>04/12/2025</a:t>
             </a:fld>
             <a:endParaRPr lang="en-GB"/>
           </a:p>
@@ -874,7 +874,7 @@
           <a:p>
             <a:fld id="{CCA5D086-41C3-45A3-9AA5-B506825A19E0}" type="datetimeFigureOut">
               <a:rPr lang="en-GB" smtClean="0"/>
-              <a:t>01/10/2025</a:t>
+              <a:t>04/12/2025</a:t>
             </a:fld>
             <a:endParaRPr lang="en-GB"/>
           </a:p>
@@ -1150,7 +1150,7 @@
           <a:p>
             <a:fld id="{CCA5D086-41C3-45A3-9AA5-B506825A19E0}" type="datetimeFigureOut">
               <a:rPr lang="en-GB" smtClean="0"/>
-              <a:t>01/10/2025</a:t>
+              <a:t>04/12/2025</a:t>
             </a:fld>
             <a:endParaRPr lang="en-GB"/>
           </a:p>
@@ -1418,7 +1418,7 @@
           <a:p>
             <a:fld id="{CCA5D086-41C3-45A3-9AA5-B506825A19E0}" type="datetimeFigureOut">
               <a:rPr lang="en-GB" smtClean="0"/>
-              <a:t>01/10/2025</a:t>
+              <a:t>04/12/2025</a:t>
             </a:fld>
             <a:endParaRPr lang="en-GB"/>
           </a:p>
@@ -1833,7 +1833,7 @@
           <a:p>
             <a:fld id="{CCA5D086-41C3-45A3-9AA5-B506825A19E0}" type="datetimeFigureOut">
               <a:rPr lang="en-GB" smtClean="0"/>
-              <a:t>01/10/2025</a:t>
+              <a:t>04/12/2025</a:t>
             </a:fld>
             <a:endParaRPr lang="en-GB"/>
           </a:p>
@@ -1975,7 +1975,7 @@
           <a:p>
             <a:fld id="{CCA5D086-41C3-45A3-9AA5-B506825A19E0}" type="datetimeFigureOut">
               <a:rPr lang="en-GB" smtClean="0"/>
-              <a:t>01/10/2025</a:t>
+              <a:t>04/12/2025</a:t>
             </a:fld>
             <a:endParaRPr lang="en-GB"/>
           </a:p>
@@ -2088,7 +2088,7 @@
           <a:p>
             <a:fld id="{CCA5D086-41C3-45A3-9AA5-B506825A19E0}" type="datetimeFigureOut">
               <a:rPr lang="en-GB" smtClean="0"/>
-              <a:t>01/10/2025</a:t>
+              <a:t>04/12/2025</a:t>
             </a:fld>
             <a:endParaRPr lang="en-GB"/>
           </a:p>
@@ -2401,7 +2401,7 @@
           <a:p>
             <a:fld id="{CCA5D086-41C3-45A3-9AA5-B506825A19E0}" type="datetimeFigureOut">
               <a:rPr lang="en-GB" smtClean="0"/>
-              <a:t>01/10/2025</a:t>
+              <a:t>04/12/2025</a:t>
             </a:fld>
             <a:endParaRPr lang="en-GB"/>
           </a:p>
@@ -2690,7 +2690,7 @@
           <a:p>
             <a:fld id="{CCA5D086-41C3-45A3-9AA5-B506825A19E0}" type="datetimeFigureOut">
               <a:rPr lang="en-GB" smtClean="0"/>
-              <a:t>01/10/2025</a:t>
+              <a:t>04/12/2025</a:t>
             </a:fld>
             <a:endParaRPr lang="en-GB"/>
           </a:p>
@@ -2933,7 +2933,7 @@
           <a:p>
             <a:fld id="{CCA5D086-41C3-45A3-9AA5-B506825A19E0}" type="datetimeFigureOut">
               <a:rPr lang="en-GB" smtClean="0"/>
-              <a:t>01/10/2025</a:t>
+              <a:t>04/12/2025</a:t>
             </a:fld>
             <a:endParaRPr lang="en-GB"/>
           </a:p>
@@ -3934,66 +3934,6 @@
           </a:p>
         </p:txBody>
       </p:sp>
-      <p:pic>
-        <p:nvPicPr>
-          <p:cNvPr id="28" name="Picture 27">
-            <a:extLst>
-              <a:ext uri="{FF2B5EF4-FFF2-40B4-BE49-F238E27FC236}">
-                <a16:creationId xmlns:a16="http://schemas.microsoft.com/office/drawing/2014/main" id="{BD43B532-5FA6-DA38-7556-19C4B8D61DF4}"/>
-              </a:ext>
-            </a:extLst>
-          </p:cNvPr>
-          <p:cNvPicPr>
-            <a:picLocks noChangeAspect="1"/>
-          </p:cNvPicPr>
-          <p:nvPr/>
-        </p:nvPicPr>
-        <p:blipFill>
-          <a:blip r:embed="rId8"/>
-          <a:stretch>
-            <a:fillRect/>
-          </a:stretch>
-        </p:blipFill>
-        <p:spPr>
-          <a:xfrm>
-            <a:off x="636924" y="609600"/>
-            <a:ext cx="3589179" cy="2691884"/>
-          </a:xfrm>
-          <a:prstGeom prst="rect">
-            <a:avLst/>
-          </a:prstGeom>
-        </p:spPr>
-      </p:pic>
-      <p:pic>
-        <p:nvPicPr>
-          <p:cNvPr id="30" name="Picture 29">
-            <a:extLst>
-              <a:ext uri="{FF2B5EF4-FFF2-40B4-BE49-F238E27FC236}">
-                <a16:creationId xmlns:a16="http://schemas.microsoft.com/office/drawing/2014/main" id="{4D0099B9-88A3-835E-70F9-B5E55B22CEAB}"/>
-              </a:ext>
-            </a:extLst>
-          </p:cNvPr>
-          <p:cNvPicPr>
-            <a:picLocks noChangeAspect="1"/>
-          </p:cNvPicPr>
-          <p:nvPr/>
-        </p:nvPicPr>
-        <p:blipFill>
-          <a:blip r:embed="rId9"/>
-          <a:stretch>
-            <a:fillRect/>
-          </a:stretch>
-        </p:blipFill>
-        <p:spPr>
-          <a:xfrm>
-            <a:off x="317500" y="3556517"/>
-            <a:ext cx="3852333" cy="2889250"/>
-          </a:xfrm>
-          <a:prstGeom prst="rect">
-            <a:avLst/>
-          </a:prstGeom>
-        </p:spPr>
-      </p:pic>
     </p:spTree>
     <p:extLst>
       <p:ext uri="{BB962C8B-B14F-4D97-AF65-F5344CB8AC3E}">
@@ -4085,10 +4025,10 @@
       </p:pic>
       <p:pic>
         <p:nvPicPr>
-          <p:cNvPr id="13" name="Picture 12">
-            <a:extLst>
-              <a:ext uri="{FF2B5EF4-FFF2-40B4-BE49-F238E27FC236}">
-                <a16:creationId xmlns:a16="http://schemas.microsoft.com/office/drawing/2014/main" id="{CA59CD04-56BC-B6E1-1FC8-C84B4D3B5349}"/>
+          <p:cNvPr id="6" name="Picture 5">
+            <a:extLst>
+              <a:ext uri="{FF2B5EF4-FFF2-40B4-BE49-F238E27FC236}">
+                <a16:creationId xmlns:a16="http://schemas.microsoft.com/office/drawing/2014/main" id="{9C381C46-B5B4-677A-E053-98158F72F543}"/>
               </a:ext>
             </a:extLst>
           </p:cNvPr>
@@ -4105,20 +4045,146 @@
         </p:blipFill>
         <p:spPr>
           <a:xfrm>
-            <a:off x="3461618" y="1537019"/>
-            <a:ext cx="3325462" cy="2494097"/>
+            <a:off x="7672783" y="1712894"/>
+            <a:ext cx="3594073" cy="160865"/>
           </a:xfrm>
           <a:prstGeom prst="rect">
             <a:avLst/>
           </a:prstGeom>
         </p:spPr>
       </p:pic>
+      <p:graphicFrame>
+        <p:nvGraphicFramePr>
+          <p:cNvPr id="2" name="Object 1">
+            <a:extLst>
+              <a:ext uri="{FF2B5EF4-FFF2-40B4-BE49-F238E27FC236}">
+                <a16:creationId xmlns:a16="http://schemas.microsoft.com/office/drawing/2014/main" id="{E2751E87-45D9-AB2A-1E2D-9BC5F4F1DE53}"/>
+              </a:ext>
+            </a:extLst>
+          </p:cNvPr>
+          <p:cNvGraphicFramePr>
+            <a:graphicFrameLocks noChangeAspect="1"/>
+          </p:cNvGraphicFramePr>
+          <p:nvPr>
+            <p:extLst>
+              <p:ext uri="{D42A27DB-BD31-4B8C-83A1-F6EECF244321}">
+                <p14:modId xmlns:p14="http://schemas.microsoft.com/office/powerpoint/2010/main" val="949176054"/>
+              </p:ext>
+            </p:extLst>
+          </p:nvPr>
+        </p:nvGraphicFramePr>
+        <p:xfrm>
+          <a:off x="8528050" y="4886325"/>
+          <a:ext cx="114300" cy="177800"/>
+        </p:xfrm>
+        <a:graphic>
+          <a:graphicData uri="http://schemas.openxmlformats.org/presentationml/2006/ole">
+            <mc:AlternateContent xmlns:mc="http://schemas.openxmlformats.org/markup-compatibility/2006">
+              <mc:Choice xmlns:v="urn:schemas-microsoft-com:vml" Requires="v">
+                <p:oleObj name="Equation" r:id="rId5" imgW="114120" imgH="177480" progId="Equation.DSMT4">
+                  <p:embed/>
+                </p:oleObj>
+              </mc:Choice>
+              <mc:Fallback>
+                <p:oleObj name="Equation" r:id="rId5" imgW="114120" imgH="177480" progId="Equation.DSMT4">
+                  <p:embed/>
+                  <p:pic>
+                    <p:nvPicPr>
+                      <p:cNvPr id="0" name=""/>
+                      <p:cNvPicPr/>
+                      <p:nvPr/>
+                    </p:nvPicPr>
+                    <p:blipFill>
+                      <a:blip r:embed="rId6"/>
+                      <a:stretch>
+                        <a:fillRect/>
+                      </a:stretch>
+                    </p:blipFill>
+                    <p:spPr>
+                      <a:xfrm>
+                        <a:off x="8528050" y="4886325"/>
+                        <a:ext cx="114300" cy="177800"/>
+                      </a:xfrm>
+                      <a:prstGeom prst="rect">
+                        <a:avLst/>
+                      </a:prstGeom>
+                    </p:spPr>
+                  </p:pic>
+                </p:oleObj>
+              </mc:Fallback>
+            </mc:AlternateContent>
+          </a:graphicData>
+        </a:graphic>
+      </p:graphicFrame>
+      <p:graphicFrame>
+        <p:nvGraphicFramePr>
+          <p:cNvPr id="3" name="Object 2">
+            <a:extLst>
+              <a:ext uri="{FF2B5EF4-FFF2-40B4-BE49-F238E27FC236}">
+                <a16:creationId xmlns:a16="http://schemas.microsoft.com/office/drawing/2014/main" id="{E7CF93D0-3EB1-D733-EE3D-79FD07E004CB}"/>
+              </a:ext>
+            </a:extLst>
+          </p:cNvPr>
+          <p:cNvGraphicFramePr>
+            <a:graphicFrameLocks noChangeAspect="1"/>
+          </p:cNvGraphicFramePr>
+          <p:nvPr>
+            <p:extLst>
+              <p:ext uri="{D42A27DB-BD31-4B8C-83A1-F6EECF244321}">
+                <p14:modId xmlns:p14="http://schemas.microsoft.com/office/powerpoint/2010/main" val="3810506922"/>
+              </p:ext>
+            </p:extLst>
+          </p:nvPr>
+        </p:nvGraphicFramePr>
+        <p:xfrm>
+          <a:off x="6496050" y="3298825"/>
+          <a:ext cx="114300" cy="177800"/>
+        </p:xfrm>
+        <a:graphic>
+          <a:graphicData uri="http://schemas.openxmlformats.org/presentationml/2006/ole">
+            <mc:AlternateContent xmlns:mc="http://schemas.openxmlformats.org/markup-compatibility/2006">
+              <mc:Choice xmlns:v="urn:schemas-microsoft-com:vml" Requires="v">
+                <p:oleObj name="Equation" r:id="rId7" imgW="114120" imgH="177480" progId="Equation.DSMT4">
+                  <p:embed/>
+                </p:oleObj>
+              </mc:Choice>
+              <mc:Fallback>
+                <p:oleObj name="Equation" r:id="rId7" imgW="114120" imgH="177480" progId="Equation.DSMT4">
+                  <p:embed/>
+                  <p:pic>
+                    <p:nvPicPr>
+                      <p:cNvPr id="0" name=""/>
+                      <p:cNvPicPr/>
+                      <p:nvPr/>
+                    </p:nvPicPr>
+                    <p:blipFill>
+                      <a:blip r:embed="rId6"/>
+                      <a:stretch>
+                        <a:fillRect/>
+                      </a:stretch>
+                    </p:blipFill>
+                    <p:spPr>
+                      <a:xfrm>
+                        <a:off x="6496050" y="3298825"/>
+                        <a:ext cx="114300" cy="177800"/>
+                      </a:xfrm>
+                      <a:prstGeom prst="rect">
+                        <a:avLst/>
+                      </a:prstGeom>
+                    </p:spPr>
+                  </p:pic>
+                </p:oleObj>
+              </mc:Fallback>
+            </mc:AlternateContent>
+          </a:graphicData>
+        </a:graphic>
+      </p:graphicFrame>
       <p:pic>
         <p:nvPicPr>
-          <p:cNvPr id="15" name="Picture 14">
-            <a:extLst>
-              <a:ext uri="{FF2B5EF4-FFF2-40B4-BE49-F238E27FC236}">
-                <a16:creationId xmlns:a16="http://schemas.microsoft.com/office/drawing/2014/main" id="{0AFC4471-0821-0F58-2F24-38D7B022F803}"/>
+          <p:cNvPr id="8" name="Picture 7">
+            <a:extLst>
+              <a:ext uri="{FF2B5EF4-FFF2-40B4-BE49-F238E27FC236}">
+                <a16:creationId xmlns:a16="http://schemas.microsoft.com/office/drawing/2014/main" id="{7053646C-33FD-1ED3-3C66-D2EF0E2C61F5}"/>
               </a:ext>
             </a:extLst>
           </p:cNvPr>
@@ -4128,81 +4194,1059 @@
           <p:nvPr/>
         </p:nvPicPr>
         <p:blipFill>
-          <a:blip r:embed="rId5"/>
+          <a:blip r:embed="rId8"/>
           <a:stretch>
             <a:fillRect/>
           </a:stretch>
         </p:blipFill>
         <p:spPr>
           <a:xfrm>
-            <a:off x="3370781" y="4190998"/>
-            <a:ext cx="3416299" cy="2562224"/>
+            <a:off x="7728296" y="2171930"/>
+            <a:ext cx="2730480" cy="203198"/>
           </a:xfrm>
           <a:prstGeom prst="rect">
             <a:avLst/>
           </a:prstGeom>
         </p:spPr>
       </p:pic>
-      <p:pic>
-        <p:nvPicPr>
-          <p:cNvPr id="21" name="Picture 20">
-            <a:extLst>
-              <a:ext uri="{FF2B5EF4-FFF2-40B4-BE49-F238E27FC236}">
-                <a16:creationId xmlns:a16="http://schemas.microsoft.com/office/drawing/2014/main" id="{BAB8699B-5040-AAF1-FF67-8350C8EF23FB}"/>
-              </a:ext>
-            </a:extLst>
-          </p:cNvPr>
-          <p:cNvPicPr>
-            <a:picLocks noChangeAspect="1"/>
-          </p:cNvPicPr>
-          <p:nvPr/>
-        </p:nvPicPr>
-        <p:blipFill>
-          <a:blip r:embed="rId6"/>
-          <a:stretch>
-            <a:fillRect/>
-          </a:stretch>
-        </p:blipFill>
-        <p:spPr>
-          <a:xfrm>
-            <a:off x="0" y="4090986"/>
-            <a:ext cx="3682997" cy="2762248"/>
-          </a:xfrm>
-          <a:prstGeom prst="rect">
-            <a:avLst/>
-          </a:prstGeom>
-        </p:spPr>
-      </p:pic>
-      <p:pic>
-        <p:nvPicPr>
-          <p:cNvPr id="22" name="Picture 21">
-            <a:extLst>
-              <a:ext uri="{FF2B5EF4-FFF2-40B4-BE49-F238E27FC236}">
-                <a16:creationId xmlns:a16="http://schemas.microsoft.com/office/drawing/2014/main" id="{C761AF5A-9CEF-0342-1FDB-8F58D35E073D}"/>
-              </a:ext>
-            </a:extLst>
-          </p:cNvPr>
-          <p:cNvPicPr>
-            <a:picLocks noChangeAspect="1"/>
-          </p:cNvPicPr>
-          <p:nvPr/>
-        </p:nvPicPr>
-        <p:blipFill>
-          <a:blip r:embed="rId7"/>
-          <a:stretch>
-            <a:fillRect/>
-          </a:stretch>
-        </p:blipFill>
-        <p:spPr>
-          <a:xfrm>
-            <a:off x="0" y="1438126"/>
-            <a:ext cx="3589179" cy="2691884"/>
-          </a:xfrm>
-          <a:prstGeom prst="rect">
-            <a:avLst/>
-          </a:prstGeom>
-        </p:spPr>
-      </p:pic>
+      <mc:AlternateContent xmlns:mc="http://schemas.openxmlformats.org/markup-compatibility/2006">
+        <mc:Choice xmlns:a14="http://schemas.microsoft.com/office/drawing/2010/main" Requires="a14">
+          <p:sp>
+            <p:nvSpPr>
+              <p:cNvPr id="9" name="TextBox 8">
+                <a:extLst>
+                  <a:ext uri="{FF2B5EF4-FFF2-40B4-BE49-F238E27FC236}">
+                    <a16:creationId xmlns:a16="http://schemas.microsoft.com/office/drawing/2014/main" id="{1788FE60-F7B9-BCE4-91E8-9B3E9164C44C}"/>
+                  </a:ext>
+                </a:extLst>
+              </p:cNvPr>
+              <p:cNvSpPr txBox="1"/>
+              <p:nvPr/>
+            </p:nvSpPr>
+            <p:spPr>
+              <a:xfrm>
+                <a:off x="486611" y="2912753"/>
+                <a:ext cx="11218777" cy="563872"/>
+              </a:xfrm>
+              <a:prstGeom prst="rect">
+                <a:avLst/>
+              </a:prstGeom>
+              <a:noFill/>
+            </p:spPr>
+            <p:txBody>
+              <a:bodyPr wrap="none" lIns="0" tIns="0" rIns="0" bIns="0" rtlCol="0">
+                <a:spAutoFit/>
+              </a:bodyPr>
+              <a:lstStyle/>
+              <a:p>
+                <a14:m>
+                  <m:oMath xmlns:m="http://schemas.openxmlformats.org/officeDocument/2006/math">
+                    <m:f>
+                      <m:fPr>
+                        <m:ctrlPr>
+                          <a:rPr lang="en-GB" i="1" smtClean="0">
+                            <a:latin typeface="Cambria Math" panose="02040503050406030204" pitchFamily="18" charset="0"/>
+                            <a:ea typeface="Cambria Math" panose="02040503050406030204" pitchFamily="18" charset="0"/>
+                          </a:rPr>
+                        </m:ctrlPr>
+                      </m:fPr>
+                      <m:num>
+                        <m:sSup>
+                          <m:sSupPr>
+                            <m:ctrlPr>
+                              <a:rPr lang="en-GB" i="1">
+                                <a:latin typeface="Cambria Math" panose="02040503050406030204" pitchFamily="18" charset="0"/>
+                                <a:ea typeface="Cambria Math" panose="02040503050406030204" pitchFamily="18" charset="0"/>
+                              </a:rPr>
+                            </m:ctrlPr>
+                          </m:sSupPr>
+                          <m:e>
+                            <m:r>
+                              <a:rPr lang="en-GB" i="1">
+                                <a:latin typeface="Cambria Math" panose="02040503050406030204" pitchFamily="18" charset="0"/>
+                                <a:ea typeface="Cambria Math" panose="02040503050406030204" pitchFamily="18" charset="0"/>
+                              </a:rPr>
+                              <m:t>𝑑</m:t>
+                            </m:r>
+                          </m:e>
+                          <m:sup>
+                            <m:r>
+                              <a:rPr lang="en-GB" i="1">
+                                <a:latin typeface="Cambria Math" panose="02040503050406030204" pitchFamily="18" charset="0"/>
+                                <a:ea typeface="Cambria Math" panose="02040503050406030204" pitchFamily="18" charset="0"/>
+                              </a:rPr>
+                              <m:t>2</m:t>
+                            </m:r>
+                          </m:sup>
+                        </m:sSup>
+                        <m:r>
+                          <a:rPr lang="en-GB" i="1">
+                            <a:latin typeface="Cambria Math" panose="02040503050406030204" pitchFamily="18" charset="0"/>
+                            <a:ea typeface="Cambria Math" panose="02040503050406030204" pitchFamily="18" charset="0"/>
+                          </a:rPr>
+                          <m:t>𝜎</m:t>
+                        </m:r>
+                      </m:num>
+                      <m:den>
+                        <m:r>
+                          <a:rPr lang="en-GB" i="1">
+                            <a:latin typeface="Cambria Math" panose="02040503050406030204" pitchFamily="18" charset="0"/>
+                            <a:ea typeface="Cambria Math" panose="02040503050406030204" pitchFamily="18" charset="0"/>
+                          </a:rPr>
+                          <m:t>𝑑</m:t>
+                        </m:r>
+                        <m:r>
+                          <m:rPr>
+                            <m:sty m:val="p"/>
+                          </m:rPr>
+                          <a:rPr lang="el-GR" i="1">
+                            <a:latin typeface="Cambria Math" panose="02040503050406030204" pitchFamily="18" charset="0"/>
+                            <a:ea typeface="Cambria Math" panose="02040503050406030204" pitchFamily="18" charset="0"/>
+                          </a:rPr>
+                          <m:t>Ω</m:t>
+                        </m:r>
+                        <m:sSub>
+                          <m:sSubPr>
+                            <m:ctrlPr>
+                              <a:rPr lang="en-GB" i="1">
+                                <a:latin typeface="Cambria Math" panose="02040503050406030204" pitchFamily="18" charset="0"/>
+                                <a:ea typeface="Cambria Math" panose="02040503050406030204" pitchFamily="18" charset="0"/>
+                              </a:rPr>
+                            </m:ctrlPr>
+                          </m:sSubPr>
+                          <m:e>
+                            <m:r>
+                              <a:rPr lang="en-GB" i="1">
+                                <a:latin typeface="Cambria Math" panose="02040503050406030204" pitchFamily="18" charset="0"/>
+                                <a:ea typeface="Cambria Math" panose="02040503050406030204" pitchFamily="18" charset="0"/>
+                              </a:rPr>
+                              <m:t>𝑑𝐸</m:t>
+                            </m:r>
+                          </m:e>
+                          <m:sub>
+                            <m:r>
+                              <a:rPr lang="en-GB" i="1">
+                                <a:latin typeface="Cambria Math" panose="02040503050406030204" pitchFamily="18" charset="0"/>
+                                <a:ea typeface="Cambria Math" panose="02040503050406030204" pitchFamily="18" charset="0"/>
+                              </a:rPr>
+                              <m:t>𝑓</m:t>
+                            </m:r>
+                          </m:sub>
+                        </m:sSub>
+                      </m:den>
+                    </m:f>
+                    <m:f>
+                      <m:fPr>
+                        <m:ctrlPr>
+                          <a:rPr lang="en-GB" i="1">
+                            <a:latin typeface="Cambria Math" panose="02040503050406030204" pitchFamily="18" charset="0"/>
+                            <a:ea typeface="Cambria Math" panose="02040503050406030204" pitchFamily="18" charset="0"/>
+                          </a:rPr>
+                        </m:ctrlPr>
+                      </m:fPr>
+                      <m:num>
+                        <m:sSub>
+                          <m:sSubPr>
+                            <m:ctrlPr>
+                              <a:rPr lang="en-GB" i="1">
+                                <a:latin typeface="Cambria Math" panose="02040503050406030204" pitchFamily="18" charset="0"/>
+                                <a:ea typeface="Cambria Math" panose="02040503050406030204" pitchFamily="18" charset="0"/>
+                              </a:rPr>
+                            </m:ctrlPr>
+                          </m:sSubPr>
+                          <m:e>
+                            <m:r>
+                              <a:rPr lang="en-GB" i="1">
+                                <a:latin typeface="Cambria Math" panose="02040503050406030204" pitchFamily="18" charset="0"/>
+                                <a:ea typeface="Cambria Math" panose="02040503050406030204" pitchFamily="18" charset="0"/>
+                              </a:rPr>
+                              <m:t>𝑘</m:t>
+                            </m:r>
+                          </m:e>
+                          <m:sub>
+                            <m:r>
+                              <a:rPr lang="en-GB" i="1">
+                                <a:latin typeface="Cambria Math" panose="02040503050406030204" pitchFamily="18" charset="0"/>
+                                <a:ea typeface="Cambria Math" panose="02040503050406030204" pitchFamily="18" charset="0"/>
+                              </a:rPr>
+                              <m:t>𝑖</m:t>
+                            </m:r>
+                          </m:sub>
+                        </m:sSub>
+                      </m:num>
+                      <m:den>
+                        <m:sSub>
+                          <m:sSubPr>
+                            <m:ctrlPr>
+                              <a:rPr lang="en-GB" i="1">
+                                <a:latin typeface="Cambria Math" panose="02040503050406030204" pitchFamily="18" charset="0"/>
+                                <a:ea typeface="Cambria Math" panose="02040503050406030204" pitchFamily="18" charset="0"/>
+                              </a:rPr>
+                            </m:ctrlPr>
+                          </m:sSubPr>
+                          <m:e>
+                            <m:r>
+                              <a:rPr lang="en-GB" i="1">
+                                <a:latin typeface="Cambria Math" panose="02040503050406030204" pitchFamily="18" charset="0"/>
+                                <a:ea typeface="Cambria Math" panose="02040503050406030204" pitchFamily="18" charset="0"/>
+                              </a:rPr>
+                              <m:t>𝑘</m:t>
+                            </m:r>
+                          </m:e>
+                          <m:sub>
+                            <m:r>
+                              <a:rPr lang="en-GB" i="1">
+                                <a:latin typeface="Cambria Math" panose="02040503050406030204" pitchFamily="18" charset="0"/>
+                                <a:ea typeface="Cambria Math" panose="02040503050406030204" pitchFamily="18" charset="0"/>
+                              </a:rPr>
+                              <m:t>𝑓</m:t>
+                            </m:r>
+                          </m:sub>
+                        </m:sSub>
+                      </m:den>
+                    </m:f>
+                    <m:r>
+                      <a:rPr lang="en-GB" i="1">
+                        <a:latin typeface="Cambria Math" panose="02040503050406030204" pitchFamily="18" charset="0"/>
+                        <a:ea typeface="Cambria Math" panose="02040503050406030204" pitchFamily="18" charset="0"/>
+                      </a:rPr>
+                      <m:t>=</m:t>
+                    </m:r>
+                    <m:sSup>
+                      <m:sSupPr>
+                        <m:ctrlPr>
+                          <a:rPr lang="en-GB" i="1">
+                            <a:latin typeface="Cambria Math" panose="02040503050406030204" pitchFamily="18" charset="0"/>
+                            <a:ea typeface="Cambria Math" panose="02040503050406030204" pitchFamily="18" charset="0"/>
+                          </a:rPr>
+                        </m:ctrlPr>
+                      </m:sSupPr>
+                      <m:e>
+                        <m:d>
+                          <m:dPr>
+                            <m:ctrlPr>
+                              <a:rPr lang="en-GB" i="1">
+                                <a:latin typeface="Cambria Math" panose="02040503050406030204" pitchFamily="18" charset="0"/>
+                                <a:ea typeface="Cambria Math" panose="02040503050406030204" pitchFamily="18" charset="0"/>
+                              </a:rPr>
+                            </m:ctrlPr>
+                          </m:dPr>
+                          <m:e>
+                            <m:f>
+                              <m:fPr>
+                                <m:ctrlPr>
+                                  <a:rPr lang="en-GB" i="1">
+                                    <a:latin typeface="Cambria Math" panose="02040503050406030204" pitchFamily="18" charset="0"/>
+                                    <a:ea typeface="Cambria Math" panose="02040503050406030204" pitchFamily="18" charset="0"/>
+                                  </a:rPr>
+                                </m:ctrlPr>
+                              </m:fPr>
+                              <m:num>
+                                <m:r>
+                                  <a:rPr lang="en-GB" i="1">
+                                    <a:latin typeface="Cambria Math" panose="02040503050406030204" pitchFamily="18" charset="0"/>
+                                    <a:ea typeface="Cambria Math" panose="02040503050406030204" pitchFamily="18" charset="0"/>
+                                  </a:rPr>
+                                  <m:t>𝛾</m:t>
+                                </m:r>
+                                <m:sSub>
+                                  <m:sSubPr>
+                                    <m:ctrlPr>
+                                      <a:rPr lang="en-GB" i="1">
+                                        <a:latin typeface="Cambria Math" panose="02040503050406030204" pitchFamily="18" charset="0"/>
+                                        <a:ea typeface="Cambria Math" panose="02040503050406030204" pitchFamily="18" charset="0"/>
+                                      </a:rPr>
+                                    </m:ctrlPr>
+                                  </m:sSubPr>
+                                  <m:e>
+                                    <m:r>
+                                      <a:rPr lang="en-GB" i="1">
+                                        <a:latin typeface="Cambria Math" panose="02040503050406030204" pitchFamily="18" charset="0"/>
+                                        <a:ea typeface="Cambria Math" panose="02040503050406030204" pitchFamily="18" charset="0"/>
+                                      </a:rPr>
+                                      <m:t>𝑟</m:t>
+                                    </m:r>
+                                  </m:e>
+                                  <m:sub>
+                                    <m:r>
+                                      <a:rPr lang="en-GB" i="1">
+                                        <a:latin typeface="Cambria Math" panose="02040503050406030204" pitchFamily="18" charset="0"/>
+                                        <a:ea typeface="Cambria Math" panose="02040503050406030204" pitchFamily="18" charset="0"/>
+                                      </a:rPr>
+                                      <m:t>𝑜</m:t>
+                                    </m:r>
+                                  </m:sub>
+                                </m:sSub>
+                                <m:r>
+                                  <a:rPr lang="en-GB" b="0" i="1" smtClean="0">
+                                    <a:latin typeface="Cambria Math" panose="02040503050406030204" pitchFamily="18" charset="0"/>
+                                    <a:ea typeface="Cambria Math" panose="02040503050406030204" pitchFamily="18" charset="0"/>
+                                  </a:rPr>
+                                  <m:t>[</m:t>
+                                </m:r>
+                                <m:r>
+                                  <a:rPr lang="en-GB" b="0" i="1" smtClean="0">
+                                    <a:latin typeface="Cambria Math" panose="02040503050406030204" pitchFamily="18" charset="0"/>
+                                    <a:ea typeface="Cambria Math" panose="02040503050406030204" pitchFamily="18" charset="0"/>
+                                  </a:rPr>
+                                  <m:t>𝑚</m:t>
+                                </m:r>
+                                <m:r>
+                                  <a:rPr lang="en-GB" b="0" i="1" smtClean="0">
+                                    <a:latin typeface="Cambria Math" panose="02040503050406030204" pitchFamily="18" charset="0"/>
+                                    <a:ea typeface="Cambria Math" panose="02040503050406030204" pitchFamily="18" charset="0"/>
+                                  </a:rPr>
+                                  <m:t>]</m:t>
+                                </m:r>
+                              </m:num>
+                              <m:den>
+                                <m:r>
+                                  <a:rPr lang="en-GB" i="1">
+                                    <a:latin typeface="Cambria Math" panose="02040503050406030204" pitchFamily="18" charset="0"/>
+                                    <a:ea typeface="Cambria Math" panose="02040503050406030204" pitchFamily="18" charset="0"/>
+                                  </a:rPr>
+                                  <m:t>2</m:t>
+                                </m:r>
+                                <m:sSub>
+                                  <m:sSubPr>
+                                    <m:ctrlPr>
+                                      <a:rPr lang="en-GB" i="1">
+                                        <a:latin typeface="Cambria Math" panose="02040503050406030204" pitchFamily="18" charset="0"/>
+                                        <a:ea typeface="Cambria Math" panose="02040503050406030204" pitchFamily="18" charset="0"/>
+                                      </a:rPr>
+                                    </m:ctrlPr>
+                                  </m:sSubPr>
+                                  <m:e>
+                                    <m:r>
+                                      <a:rPr lang="en-GB" i="1">
+                                        <a:latin typeface="Cambria Math" panose="02040503050406030204" pitchFamily="18" charset="0"/>
+                                        <a:ea typeface="Cambria Math" panose="02040503050406030204" pitchFamily="18" charset="0"/>
+                                      </a:rPr>
+                                      <m:t>𝜇</m:t>
+                                    </m:r>
+                                  </m:e>
+                                  <m:sub>
+                                    <m:r>
+                                      <a:rPr lang="en-GB" i="1">
+                                        <a:latin typeface="Cambria Math" panose="02040503050406030204" pitchFamily="18" charset="0"/>
+                                        <a:ea typeface="Cambria Math" panose="02040503050406030204" pitchFamily="18" charset="0"/>
+                                      </a:rPr>
+                                      <m:t>𝐵</m:t>
+                                    </m:r>
+                                  </m:sub>
+                                </m:sSub>
+                              </m:den>
+                            </m:f>
+                          </m:e>
+                        </m:d>
+                      </m:e>
+                      <m:sup>
+                        <m:r>
+                          <a:rPr lang="en-GB" i="1">
+                            <a:latin typeface="Cambria Math" panose="02040503050406030204" pitchFamily="18" charset="0"/>
+                            <a:ea typeface="Cambria Math" panose="02040503050406030204" pitchFamily="18" charset="0"/>
+                          </a:rPr>
+                          <m:t>2</m:t>
+                        </m:r>
+                      </m:sup>
+                    </m:sSup>
+                    <m:d>
+                      <m:dPr>
+                        <m:ctrlPr>
+                          <a:rPr lang="en-GB" i="1" smtClean="0">
+                            <a:latin typeface="Cambria Math" panose="02040503050406030204" pitchFamily="18" charset="0"/>
+                            <a:ea typeface="Cambria Math" panose="02040503050406030204" pitchFamily="18" charset="0"/>
+                          </a:rPr>
+                        </m:ctrlPr>
+                      </m:dPr>
+                      <m:e>
+                        <m:r>
+                          <a:rPr lang="ru-RU" b="0" i="1" smtClean="0">
+                            <a:latin typeface="Cambria Math" panose="02040503050406030204" pitchFamily="18" charset="0"/>
+                            <a:ea typeface="Cambria Math" panose="02040503050406030204" pitchFamily="18" charset="0"/>
+                          </a:rPr>
+                          <m:t>1+</m:t>
+                        </m:r>
+                        <m:r>
+                          <a:rPr lang="en-GB" b="0" i="1" smtClean="0">
+                            <a:latin typeface="Cambria Math" panose="02040503050406030204" pitchFamily="18" charset="0"/>
+                            <a:ea typeface="Cambria Math" panose="02040503050406030204" pitchFamily="18" charset="0"/>
+                          </a:rPr>
+                          <m:t>𝑛</m:t>
+                        </m:r>
+                        <m:r>
+                          <a:rPr lang="en-GB" b="0" i="1" smtClean="0">
+                            <a:latin typeface="Cambria Math" panose="02040503050406030204" pitchFamily="18" charset="0"/>
+                            <a:ea typeface="Cambria Math" panose="02040503050406030204" pitchFamily="18" charset="0"/>
+                          </a:rPr>
+                          <m:t>(</m:t>
+                        </m:r>
+                        <m:r>
+                          <a:rPr lang="en-GB" b="0" i="1" smtClean="0">
+                            <a:latin typeface="Cambria Math" panose="02040503050406030204" pitchFamily="18" charset="0"/>
+                            <a:ea typeface="Cambria Math" panose="02040503050406030204" pitchFamily="18" charset="0"/>
+                          </a:rPr>
+                          <m:t>𝜔</m:t>
+                        </m:r>
+                        <m:r>
+                          <a:rPr lang="en-GB" b="0" i="1" smtClean="0">
+                            <a:latin typeface="Cambria Math" panose="02040503050406030204" pitchFamily="18" charset="0"/>
+                            <a:ea typeface="Cambria Math" panose="02040503050406030204" pitchFamily="18" charset="0"/>
+                          </a:rPr>
+                          <m:t>)</m:t>
+                        </m:r>
+                      </m:e>
+                    </m:d>
+                    <m:f>
+                      <m:fPr>
+                        <m:ctrlPr>
+                          <a:rPr lang="en-GB" i="1">
+                            <a:latin typeface="Cambria Math" panose="02040503050406030204" pitchFamily="18" charset="0"/>
+                            <a:ea typeface="Cambria Math" panose="02040503050406030204" pitchFamily="18" charset="0"/>
+                          </a:rPr>
+                        </m:ctrlPr>
+                      </m:fPr>
+                      <m:num>
+                        <m:sSup>
+                          <m:sSupPr>
+                            <m:ctrlPr>
+                              <a:rPr lang="en-GB" i="1">
+                                <a:latin typeface="Cambria Math" panose="02040503050406030204" pitchFamily="18" charset="0"/>
+                                <a:ea typeface="Cambria Math" panose="02040503050406030204" pitchFamily="18" charset="0"/>
+                              </a:rPr>
+                            </m:ctrlPr>
+                          </m:sSupPr>
+                          <m:e>
+                            <m:r>
+                              <a:rPr lang="en-GB" i="1">
+                                <a:latin typeface="Cambria Math" panose="02040503050406030204" pitchFamily="18" charset="0"/>
+                                <a:ea typeface="Cambria Math" panose="02040503050406030204" pitchFamily="18" charset="0"/>
+                              </a:rPr>
+                              <m:t>𝜒</m:t>
+                            </m:r>
+                          </m:e>
+                          <m:sup>
+                            <m:r>
+                              <a:rPr lang="en-GB" i="1">
+                                <a:latin typeface="Cambria Math" panose="02040503050406030204" pitchFamily="18" charset="0"/>
+                                <a:ea typeface="Cambria Math" panose="02040503050406030204" pitchFamily="18" charset="0"/>
+                              </a:rPr>
+                              <m:t>"</m:t>
+                            </m:r>
+                          </m:sup>
+                        </m:sSup>
+                      </m:num>
+                      <m:den>
+                        <m:r>
+                          <a:rPr lang="en-GB" i="1" smtClean="0">
+                            <a:latin typeface="Cambria Math" panose="02040503050406030204" pitchFamily="18" charset="0"/>
+                            <a:ea typeface="Cambria Math" panose="02040503050406030204" pitchFamily="18" charset="0"/>
+                          </a:rPr>
+                          <m:t>𝜋</m:t>
+                        </m:r>
+                      </m:den>
+                    </m:f>
+                    <m:d>
+                      <m:dPr>
+                        <m:begChr m:val="["/>
+                        <m:endChr m:val="]"/>
+                        <m:ctrlPr>
+                          <a:rPr lang="en-GB" i="1" smtClean="0">
+                            <a:latin typeface="Cambria Math" panose="02040503050406030204" pitchFamily="18" charset="0"/>
+                            <a:ea typeface="Cambria Math" panose="02040503050406030204" pitchFamily="18" charset="0"/>
+                          </a:rPr>
+                        </m:ctrlPr>
+                      </m:dPr>
+                      <m:e>
+                        <m:f>
+                          <m:fPr>
+                            <m:ctrlPr>
+                              <a:rPr lang="en-GB" i="1" smtClean="0">
+                                <a:latin typeface="Cambria Math" panose="02040503050406030204" pitchFamily="18" charset="0"/>
+                                <a:ea typeface="Cambria Math" panose="02040503050406030204" pitchFamily="18" charset="0"/>
+                              </a:rPr>
+                            </m:ctrlPr>
+                          </m:fPr>
+                          <m:num>
+                            <m:sSup>
+                              <m:sSupPr>
+                                <m:ctrlPr>
+                                  <a:rPr lang="en-GB" i="1" smtClean="0">
+                                    <a:latin typeface="Cambria Math" panose="02040503050406030204" pitchFamily="18" charset="0"/>
+                                    <a:ea typeface="Cambria Math" panose="02040503050406030204" pitchFamily="18" charset="0"/>
+                                  </a:rPr>
+                                </m:ctrlPr>
+                              </m:sSupPr>
+                              <m:e>
+                                <m:sSub>
+                                  <m:sSubPr>
+                                    <m:ctrlPr>
+                                      <a:rPr lang="en-GB" i="1">
+                                        <a:latin typeface="Cambria Math" panose="02040503050406030204" pitchFamily="18" charset="0"/>
+                                        <a:ea typeface="Cambria Math" panose="02040503050406030204" pitchFamily="18" charset="0"/>
+                                      </a:rPr>
+                                    </m:ctrlPr>
+                                  </m:sSubPr>
+                                  <m:e>
+                                    <m:r>
+                                      <a:rPr lang="en-GB" i="1">
+                                        <a:latin typeface="Cambria Math" panose="02040503050406030204" pitchFamily="18" charset="0"/>
+                                        <a:ea typeface="Cambria Math" panose="02040503050406030204" pitchFamily="18" charset="0"/>
+                                      </a:rPr>
+                                      <m:t>𝜇</m:t>
+                                    </m:r>
+                                  </m:e>
+                                  <m:sub>
+                                    <m:r>
+                                      <a:rPr lang="en-GB" i="1">
+                                        <a:latin typeface="Cambria Math" panose="02040503050406030204" pitchFamily="18" charset="0"/>
+                                        <a:ea typeface="Cambria Math" panose="02040503050406030204" pitchFamily="18" charset="0"/>
+                                      </a:rPr>
+                                      <m:t>𝐵</m:t>
+                                    </m:r>
+                                  </m:sub>
+                                </m:sSub>
+                              </m:e>
+                              <m:sup>
+                                <m:r>
+                                  <a:rPr lang="en-GB" b="0" i="1" smtClean="0">
+                                    <a:latin typeface="Cambria Math" panose="02040503050406030204" pitchFamily="18" charset="0"/>
+                                    <a:ea typeface="Cambria Math" panose="02040503050406030204" pitchFamily="18" charset="0"/>
+                                  </a:rPr>
+                                  <m:t>2</m:t>
+                                </m:r>
+                              </m:sup>
+                            </m:sSup>
+                          </m:num>
+                          <m:den>
+                            <m:r>
+                              <a:rPr lang="en-GB" b="0" i="1" smtClean="0">
+                                <a:latin typeface="Cambria Math" panose="02040503050406030204" pitchFamily="18" charset="0"/>
+                                <a:ea typeface="Cambria Math" panose="02040503050406030204" pitchFamily="18" charset="0"/>
+                              </a:rPr>
+                              <m:t>𝑅𝑦</m:t>
+                            </m:r>
+                          </m:den>
+                        </m:f>
+                      </m:e>
+                    </m:d>
+                    <m:r>
+                      <a:rPr lang="en-GB" b="0" i="1" smtClean="0">
+                        <a:latin typeface="Cambria Math" panose="02040503050406030204" pitchFamily="18" charset="0"/>
+                        <a:ea typeface="Cambria Math" panose="02040503050406030204" pitchFamily="18" charset="0"/>
+                      </a:rPr>
+                      <m:t>=</m:t>
+                    </m:r>
+                  </m:oMath>
+                </a14:m>
+                <a:r>
+                  <a:rPr lang="en-GB" dirty="0">
+                    <a:ea typeface="Cambria Math" panose="02040503050406030204" pitchFamily="18" charset="0"/>
+                  </a:rPr>
+                  <a:t> </a:t>
+                </a:r>
+                <a14:m>
+                  <m:oMath xmlns:m="http://schemas.openxmlformats.org/officeDocument/2006/math">
+                    <m:sSup>
+                      <m:sSupPr>
+                        <m:ctrlPr>
+                          <a:rPr lang="en-GB" i="1">
+                            <a:latin typeface="Cambria Math" panose="02040503050406030204" pitchFamily="18" charset="0"/>
+                            <a:ea typeface="Cambria Math" panose="02040503050406030204" pitchFamily="18" charset="0"/>
+                          </a:rPr>
+                        </m:ctrlPr>
+                      </m:sSupPr>
+                      <m:e>
+                        <m:r>
+                          <a:rPr lang="en-GB" i="1">
+                            <a:latin typeface="Cambria Math" panose="02040503050406030204" pitchFamily="18" charset="0"/>
+                            <a:ea typeface="Cambria Math" panose="02040503050406030204" pitchFamily="18" charset="0"/>
+                          </a:rPr>
+                          <m:t>𝜒</m:t>
+                        </m:r>
+                      </m:e>
+                      <m:sup>
+                        <m:r>
+                          <a:rPr lang="en-GB" i="1">
+                            <a:latin typeface="Cambria Math" panose="02040503050406030204" pitchFamily="18" charset="0"/>
+                            <a:ea typeface="Cambria Math" panose="02040503050406030204" pitchFamily="18" charset="0"/>
+                          </a:rPr>
+                          <m:t>"</m:t>
+                        </m:r>
+                      </m:sup>
+                    </m:sSup>
+                    <m:d>
+                      <m:dPr>
+                        <m:ctrlPr>
+                          <a:rPr lang="en-GB" i="1" smtClean="0">
+                            <a:latin typeface="Cambria Math" panose="02040503050406030204" pitchFamily="18" charset="0"/>
+                            <a:ea typeface="Cambria Math" panose="02040503050406030204" pitchFamily="18" charset="0"/>
+                          </a:rPr>
+                        </m:ctrlPr>
+                      </m:dPr>
+                      <m:e>
+                        <m:r>
+                          <a:rPr lang="en-GB" b="0" i="1" smtClean="0">
+                            <a:latin typeface="Cambria Math" panose="02040503050406030204" pitchFamily="18" charset="0"/>
+                            <a:ea typeface="Cambria Math" panose="02040503050406030204" pitchFamily="18" charset="0"/>
+                          </a:rPr>
+                          <m:t>1+</m:t>
+                        </m:r>
+                        <m:r>
+                          <a:rPr lang="en-GB" b="0" i="1" smtClean="0">
+                            <a:latin typeface="Cambria Math" panose="02040503050406030204" pitchFamily="18" charset="0"/>
+                            <a:ea typeface="Cambria Math" panose="02040503050406030204" pitchFamily="18" charset="0"/>
+                          </a:rPr>
+                          <m:t>𝑛</m:t>
+                        </m:r>
+                        <m:r>
+                          <a:rPr lang="en-GB" b="0" i="1" smtClean="0">
+                            <a:latin typeface="Cambria Math" panose="02040503050406030204" pitchFamily="18" charset="0"/>
+                            <a:ea typeface="Cambria Math" panose="02040503050406030204" pitchFamily="18" charset="0"/>
+                          </a:rPr>
+                          <m:t>(</m:t>
+                        </m:r>
+                        <m:r>
+                          <a:rPr lang="en-GB" b="0" i="1" smtClean="0">
+                            <a:latin typeface="Cambria Math" panose="02040503050406030204" pitchFamily="18" charset="0"/>
+                            <a:ea typeface="Cambria Math" panose="02040503050406030204" pitchFamily="18" charset="0"/>
+                          </a:rPr>
+                          <m:t>𝜔</m:t>
+                        </m:r>
+                        <m:r>
+                          <a:rPr lang="en-GB" b="0" i="1" smtClean="0">
+                            <a:latin typeface="Cambria Math" panose="02040503050406030204" pitchFamily="18" charset="0"/>
+                            <a:ea typeface="Cambria Math" panose="02040503050406030204" pitchFamily="18" charset="0"/>
+                          </a:rPr>
+                          <m:t>)</m:t>
+                        </m:r>
+                      </m:e>
+                    </m:d>
+                    <m:f>
+                      <m:fPr>
+                        <m:ctrlPr>
+                          <a:rPr lang="en-GB" i="1" smtClean="0">
+                            <a:latin typeface="Cambria Math" panose="02040503050406030204" pitchFamily="18" charset="0"/>
+                            <a:ea typeface="Cambria Math" panose="02040503050406030204" pitchFamily="18" charset="0"/>
+                          </a:rPr>
+                        </m:ctrlPr>
+                      </m:fPr>
+                      <m:num>
+                        <m:sSup>
+                          <m:sSupPr>
+                            <m:ctrlPr>
+                              <a:rPr lang="en-GB" i="1" smtClean="0">
+                                <a:latin typeface="Cambria Math" panose="02040503050406030204" pitchFamily="18" charset="0"/>
+                                <a:ea typeface="Cambria Math" panose="02040503050406030204" pitchFamily="18" charset="0"/>
+                              </a:rPr>
+                            </m:ctrlPr>
+                          </m:sSupPr>
+                          <m:e>
+                            <m:r>
+                              <a:rPr lang="en-GB" i="1">
+                                <a:latin typeface="Cambria Math" panose="02040503050406030204" pitchFamily="18" charset="0"/>
+                                <a:ea typeface="Cambria Math" panose="02040503050406030204" pitchFamily="18" charset="0"/>
+                              </a:rPr>
+                              <m:t>𝛾</m:t>
+                            </m:r>
+                          </m:e>
+                          <m:sup>
+                            <m:r>
+                              <a:rPr lang="en-GB" b="0" i="1" smtClean="0">
+                                <a:latin typeface="Cambria Math" panose="02040503050406030204" pitchFamily="18" charset="0"/>
+                                <a:ea typeface="Cambria Math" panose="02040503050406030204" pitchFamily="18" charset="0"/>
+                              </a:rPr>
+                              <m:t>2</m:t>
+                            </m:r>
+                          </m:sup>
+                        </m:sSup>
+                        <m:sSup>
+                          <m:sSupPr>
+                            <m:ctrlPr>
+                              <a:rPr lang="en-GB" i="1" smtClean="0">
+                                <a:latin typeface="Cambria Math" panose="02040503050406030204" pitchFamily="18" charset="0"/>
+                                <a:ea typeface="Cambria Math" panose="02040503050406030204" pitchFamily="18" charset="0"/>
+                              </a:rPr>
+                            </m:ctrlPr>
+                          </m:sSupPr>
+                          <m:e>
+                            <m:r>
+                              <a:rPr lang="en-GB" b="0" i="1" smtClean="0">
+                                <a:latin typeface="Cambria Math" panose="02040503050406030204" pitchFamily="18" charset="0"/>
+                                <a:ea typeface="Cambria Math" panose="02040503050406030204" pitchFamily="18" charset="0"/>
+                              </a:rPr>
+                              <m:t>2.818</m:t>
+                            </m:r>
+                          </m:e>
+                          <m:sup>
+                            <m:r>
+                              <a:rPr lang="en-GB" b="0" i="1" smtClean="0">
+                                <a:latin typeface="Cambria Math" panose="02040503050406030204" pitchFamily="18" charset="0"/>
+                                <a:ea typeface="Cambria Math" panose="02040503050406030204" pitchFamily="18" charset="0"/>
+                              </a:rPr>
+                              <m:t>2</m:t>
+                            </m:r>
+                          </m:sup>
+                        </m:sSup>
+                        <m:r>
+                          <a:rPr lang="en-GB" b="0" i="1" smtClean="0">
+                            <a:latin typeface="Cambria Math" panose="02040503050406030204" pitchFamily="18" charset="0"/>
+                            <a:ea typeface="Cambria Math" panose="02040503050406030204" pitchFamily="18" charset="0"/>
+                          </a:rPr>
+                          <m:t>∗</m:t>
+                        </m:r>
+                        <m:sSup>
+                          <m:sSupPr>
+                            <m:ctrlPr>
+                              <a:rPr lang="en-GB" b="0" i="1" smtClean="0">
+                                <a:latin typeface="Cambria Math" panose="02040503050406030204" pitchFamily="18" charset="0"/>
+                                <a:ea typeface="Cambria Math" panose="02040503050406030204" pitchFamily="18" charset="0"/>
+                              </a:rPr>
+                            </m:ctrlPr>
+                          </m:sSupPr>
+                          <m:e>
+                            <m:r>
+                              <a:rPr lang="en-GB" b="0" i="1" smtClean="0">
+                                <a:latin typeface="Cambria Math" panose="02040503050406030204" pitchFamily="18" charset="0"/>
+                                <a:ea typeface="Cambria Math" panose="02040503050406030204" pitchFamily="18" charset="0"/>
+                              </a:rPr>
+                              <m:t>10</m:t>
+                            </m:r>
+                          </m:e>
+                          <m:sup>
+                            <m:r>
+                              <a:rPr lang="en-GB" b="0" i="1" smtClean="0">
+                                <a:latin typeface="Cambria Math" panose="02040503050406030204" pitchFamily="18" charset="0"/>
+                                <a:ea typeface="Cambria Math" panose="02040503050406030204" pitchFamily="18" charset="0"/>
+                              </a:rPr>
+                              <m:t>−30</m:t>
+                            </m:r>
+                          </m:sup>
+                        </m:sSup>
+                        <m:r>
+                          <a:rPr lang="en-GB" b="0" i="1" smtClean="0">
+                            <a:latin typeface="Cambria Math" panose="02040503050406030204" pitchFamily="18" charset="0"/>
+                            <a:ea typeface="Cambria Math" panose="02040503050406030204" pitchFamily="18" charset="0"/>
+                          </a:rPr>
+                          <m:t>∗</m:t>
+                        </m:r>
+                        <m:sSup>
+                          <m:sSupPr>
+                            <m:ctrlPr>
+                              <a:rPr lang="en-GB" i="1">
+                                <a:latin typeface="Cambria Math" panose="02040503050406030204" pitchFamily="18" charset="0"/>
+                                <a:ea typeface="Cambria Math" panose="02040503050406030204" pitchFamily="18" charset="0"/>
+                              </a:rPr>
+                            </m:ctrlPr>
+                          </m:sSupPr>
+                          <m:e>
+                            <m:r>
+                              <a:rPr lang="en-GB" i="1">
+                                <a:latin typeface="Cambria Math" panose="02040503050406030204" pitchFamily="18" charset="0"/>
+                                <a:ea typeface="Cambria Math" panose="02040503050406030204" pitchFamily="18" charset="0"/>
+                              </a:rPr>
+                              <m:t>10</m:t>
+                            </m:r>
+                          </m:e>
+                          <m:sup>
+                            <m:r>
+                              <a:rPr lang="en-GB" i="1">
+                                <a:latin typeface="Cambria Math" panose="02040503050406030204" pitchFamily="18" charset="0"/>
+                                <a:ea typeface="Cambria Math" panose="02040503050406030204" pitchFamily="18" charset="0"/>
+                              </a:rPr>
+                              <m:t>3</m:t>
+                            </m:r>
+                            <m:r>
+                              <a:rPr lang="en-GB" b="0" i="1" smtClean="0">
+                                <a:latin typeface="Cambria Math" panose="02040503050406030204" pitchFamily="18" charset="0"/>
+                                <a:ea typeface="Cambria Math" panose="02040503050406030204" pitchFamily="18" charset="0"/>
+                              </a:rPr>
+                              <m:t>1</m:t>
+                            </m:r>
+                          </m:sup>
+                        </m:sSup>
+                        <m:r>
+                          <a:rPr lang="en-GB" b="0" i="1" smtClean="0">
+                            <a:latin typeface="Cambria Math" panose="02040503050406030204" pitchFamily="18" charset="0"/>
+                            <a:ea typeface="Cambria Math" panose="02040503050406030204" pitchFamily="18" charset="0"/>
+                          </a:rPr>
+                          <m:t>[</m:t>
+                        </m:r>
+                        <m:r>
+                          <a:rPr lang="en-GB" b="0" i="1" smtClean="0">
+                            <a:latin typeface="Cambria Math" panose="02040503050406030204" pitchFamily="18" charset="0"/>
+                            <a:ea typeface="Cambria Math" panose="02040503050406030204" pitchFamily="18" charset="0"/>
+                          </a:rPr>
+                          <m:t>𝑚𝐵𝑎𝑟𝑛</m:t>
+                        </m:r>
+                        <m:r>
+                          <a:rPr lang="en-GB" b="0" i="1" smtClean="0">
+                            <a:latin typeface="Cambria Math" panose="02040503050406030204" pitchFamily="18" charset="0"/>
+                            <a:ea typeface="Cambria Math" panose="02040503050406030204" pitchFamily="18" charset="0"/>
+                          </a:rPr>
+                          <m:t>]</m:t>
+                        </m:r>
+                      </m:num>
+                      <m:den>
+                        <m:r>
+                          <a:rPr lang="en-GB" b="0" i="1" smtClean="0">
+                            <a:latin typeface="Cambria Math" panose="02040503050406030204" pitchFamily="18" charset="0"/>
+                            <a:ea typeface="Cambria Math" panose="02040503050406030204" pitchFamily="18" charset="0"/>
+                          </a:rPr>
+                          <m:t>4</m:t>
+                        </m:r>
+                        <m:r>
+                          <a:rPr lang="en-GB" b="0" i="1" smtClean="0">
+                            <a:latin typeface="Cambria Math" panose="02040503050406030204" pitchFamily="18" charset="0"/>
+                            <a:ea typeface="Cambria Math" panose="02040503050406030204" pitchFamily="18" charset="0"/>
+                          </a:rPr>
+                          <m:t>𝜋</m:t>
+                        </m:r>
+                        <m:r>
+                          <a:rPr lang="en-GB" b="0" i="1" smtClean="0">
+                            <a:latin typeface="Cambria Math" panose="02040503050406030204" pitchFamily="18" charset="0"/>
+                            <a:ea typeface="Cambria Math" panose="02040503050406030204" pitchFamily="18" charset="0"/>
+                          </a:rPr>
+                          <m:t>∗1.36057∗</m:t>
+                        </m:r>
+                        <m:sSup>
+                          <m:sSupPr>
+                            <m:ctrlPr>
+                              <a:rPr lang="en-GB" b="0" i="1" smtClean="0">
+                                <a:latin typeface="Cambria Math" panose="02040503050406030204" pitchFamily="18" charset="0"/>
+                                <a:ea typeface="Cambria Math" panose="02040503050406030204" pitchFamily="18" charset="0"/>
+                              </a:rPr>
+                            </m:ctrlPr>
+                          </m:sSupPr>
+                          <m:e>
+                            <m:r>
+                              <a:rPr lang="en-GB" b="0" i="1" smtClean="0">
+                                <a:latin typeface="Cambria Math" panose="02040503050406030204" pitchFamily="18" charset="0"/>
+                                <a:ea typeface="Cambria Math" panose="02040503050406030204" pitchFamily="18" charset="0"/>
+                              </a:rPr>
+                              <m:t>10</m:t>
+                            </m:r>
+                          </m:e>
+                          <m:sup>
+                            <m:r>
+                              <a:rPr lang="en-GB" b="0" i="1" smtClean="0">
+                                <a:latin typeface="Cambria Math" panose="02040503050406030204" pitchFamily="18" charset="0"/>
+                                <a:ea typeface="Cambria Math" panose="02040503050406030204" pitchFamily="18" charset="0"/>
+                              </a:rPr>
+                              <m:t>4</m:t>
+                            </m:r>
+                          </m:sup>
+                        </m:sSup>
+                        <m:d>
+                          <m:dPr>
+                            <m:begChr m:val="["/>
+                            <m:endChr m:val="]"/>
+                            <m:ctrlPr>
+                              <a:rPr lang="en-GB" b="0" i="1" smtClean="0">
+                                <a:latin typeface="Cambria Math" panose="02040503050406030204" pitchFamily="18" charset="0"/>
+                                <a:ea typeface="Cambria Math" panose="02040503050406030204" pitchFamily="18" charset="0"/>
+                              </a:rPr>
+                            </m:ctrlPr>
+                          </m:dPr>
+                          <m:e>
+                            <m:r>
+                              <a:rPr lang="en-GB" b="0" i="1" smtClean="0">
+                                <a:latin typeface="Cambria Math" panose="02040503050406030204" pitchFamily="18" charset="0"/>
+                                <a:ea typeface="Cambria Math" panose="02040503050406030204" pitchFamily="18" charset="0"/>
+                              </a:rPr>
+                              <m:t>𝑚𝑒𝑉</m:t>
+                            </m:r>
+                          </m:e>
+                        </m:d>
+                      </m:den>
+                    </m:f>
+                  </m:oMath>
+                </a14:m>
+                <a:r>
+                  <a:rPr lang="en-GB" dirty="0"/>
+                  <a:t>=1.6997*10</a:t>
+                </a:r>
+                <a:r>
+                  <a:rPr lang="en-GB" baseline="30000" dirty="0"/>
+                  <a:t>-3</a:t>
+                </a:r>
+                <a:r>
+                  <a:rPr lang="en-GB" dirty="0">
+                    <a:ea typeface="Cambria Math" panose="02040503050406030204" pitchFamily="18" charset="0"/>
+                  </a:rPr>
+                  <a:t> </a:t>
+                </a:r>
+                <a14:m>
+                  <m:oMath xmlns:m="http://schemas.openxmlformats.org/officeDocument/2006/math">
+                    <m:sSup>
+                      <m:sSupPr>
+                        <m:ctrlPr>
+                          <a:rPr lang="en-GB" i="1">
+                            <a:latin typeface="Cambria Math" panose="02040503050406030204" pitchFamily="18" charset="0"/>
+                            <a:ea typeface="Cambria Math" panose="02040503050406030204" pitchFamily="18" charset="0"/>
+                          </a:rPr>
+                        </m:ctrlPr>
+                      </m:sSupPr>
+                      <m:e>
+                        <m:r>
+                          <a:rPr lang="en-GB" i="1">
+                            <a:latin typeface="Cambria Math" panose="02040503050406030204" pitchFamily="18" charset="0"/>
+                            <a:ea typeface="Cambria Math" panose="02040503050406030204" pitchFamily="18" charset="0"/>
+                          </a:rPr>
+                          <m:t>𝜒</m:t>
+                        </m:r>
+                      </m:e>
+                      <m:sup>
+                        <m:r>
+                          <a:rPr lang="en-GB" i="1">
+                            <a:latin typeface="Cambria Math" panose="02040503050406030204" pitchFamily="18" charset="0"/>
+                            <a:ea typeface="Cambria Math" panose="02040503050406030204" pitchFamily="18" charset="0"/>
+                          </a:rPr>
+                          <m:t>"</m:t>
+                        </m:r>
+                      </m:sup>
+                    </m:sSup>
+                    <m:d>
+                      <m:dPr>
+                        <m:ctrlPr>
+                          <a:rPr lang="en-GB" i="1">
+                            <a:latin typeface="Cambria Math" panose="02040503050406030204" pitchFamily="18" charset="0"/>
+                            <a:ea typeface="Cambria Math" panose="02040503050406030204" pitchFamily="18" charset="0"/>
+                          </a:rPr>
+                        </m:ctrlPr>
+                      </m:dPr>
+                      <m:e>
+                        <m:r>
+                          <a:rPr lang="en-GB" i="1">
+                            <a:latin typeface="Cambria Math" panose="02040503050406030204" pitchFamily="18" charset="0"/>
+                            <a:ea typeface="Cambria Math" panose="02040503050406030204" pitchFamily="18" charset="0"/>
+                          </a:rPr>
+                          <m:t>1+</m:t>
+                        </m:r>
+                        <m:r>
+                          <a:rPr lang="en-GB" i="1">
+                            <a:latin typeface="Cambria Math" panose="02040503050406030204" pitchFamily="18" charset="0"/>
+                            <a:ea typeface="Cambria Math" panose="02040503050406030204" pitchFamily="18" charset="0"/>
+                          </a:rPr>
+                          <m:t>𝑛</m:t>
+                        </m:r>
+                        <m:r>
+                          <a:rPr lang="en-GB" i="1">
+                            <a:latin typeface="Cambria Math" panose="02040503050406030204" pitchFamily="18" charset="0"/>
+                            <a:ea typeface="Cambria Math" panose="02040503050406030204" pitchFamily="18" charset="0"/>
+                          </a:rPr>
+                          <m:t>(</m:t>
+                        </m:r>
+                        <m:r>
+                          <a:rPr lang="en-GB" i="1">
+                            <a:latin typeface="Cambria Math" panose="02040503050406030204" pitchFamily="18" charset="0"/>
+                            <a:ea typeface="Cambria Math" panose="02040503050406030204" pitchFamily="18" charset="0"/>
+                          </a:rPr>
+                          <m:t>𝜔</m:t>
+                        </m:r>
+                        <m:r>
+                          <a:rPr lang="en-GB" i="1">
+                            <a:latin typeface="Cambria Math" panose="02040503050406030204" pitchFamily="18" charset="0"/>
+                            <a:ea typeface="Cambria Math" panose="02040503050406030204" pitchFamily="18" charset="0"/>
+                          </a:rPr>
+                          <m:t>)</m:t>
+                        </m:r>
+                      </m:e>
+                    </m:d>
+                    <m:d>
+                      <m:dPr>
+                        <m:begChr m:val="["/>
+                        <m:endChr m:val="]"/>
+                        <m:ctrlPr>
+                          <a:rPr lang="en-GB" i="1" smtClean="0">
+                            <a:latin typeface="Cambria Math" panose="02040503050406030204" pitchFamily="18" charset="0"/>
+                            <a:ea typeface="Cambria Math" panose="02040503050406030204" pitchFamily="18" charset="0"/>
+                          </a:rPr>
+                        </m:ctrlPr>
+                      </m:dPr>
+                      <m:e>
+                        <m:f>
+                          <m:fPr>
+                            <m:ctrlPr>
+                              <a:rPr lang="en-GB" i="1">
+                                <a:latin typeface="Cambria Math" panose="02040503050406030204" pitchFamily="18" charset="0"/>
+                                <a:ea typeface="Cambria Math" panose="02040503050406030204" pitchFamily="18" charset="0"/>
+                              </a:rPr>
+                            </m:ctrlPr>
+                          </m:fPr>
+                          <m:num>
+                            <m:r>
+                              <a:rPr lang="en-GB" b="0" i="1" smtClean="0">
+                                <a:latin typeface="Cambria Math" panose="02040503050406030204" pitchFamily="18" charset="0"/>
+                                <a:ea typeface="Cambria Math" panose="02040503050406030204" pitchFamily="18" charset="0"/>
+                              </a:rPr>
+                              <m:t>𝑚𝐵𝑎𝑟𝑛</m:t>
+                            </m:r>
+                          </m:num>
+                          <m:den>
+                            <m:r>
+                              <a:rPr lang="en-GB" b="0" i="1" smtClean="0">
+                                <a:latin typeface="Cambria Math" panose="02040503050406030204" pitchFamily="18" charset="0"/>
+                                <a:ea typeface="Cambria Math" panose="02040503050406030204" pitchFamily="18" charset="0"/>
+                              </a:rPr>
+                              <m:t>𝑚𝑒𝑉</m:t>
+                            </m:r>
+                          </m:den>
+                        </m:f>
+                      </m:e>
+                    </m:d>
+                  </m:oMath>
+                </a14:m>
+                <a:endParaRPr lang="en-GB" baseline="30000" dirty="0"/>
+              </a:p>
+            </p:txBody>
+          </p:sp>
+        </mc:Choice>
+        <mc:Fallback>
+          <p:sp>
+            <p:nvSpPr>
+              <p:cNvPr id="9" name="TextBox 8">
+                <a:extLst>
+                  <a:ext uri="{FF2B5EF4-FFF2-40B4-BE49-F238E27FC236}">
+                    <a16:creationId xmlns:a16="http://schemas.microsoft.com/office/drawing/2014/main" id="{1788FE60-F7B9-BCE4-91E8-9B3E9164C44C}"/>
+                  </a:ext>
+                </a:extLst>
+              </p:cNvPr>
+              <p:cNvSpPr txBox="1">
+                <a:spLocks noRot="1" noChangeAspect="1" noMove="1" noResize="1" noEditPoints="1" noAdjustHandles="1" noChangeArrowheads="1" noChangeShapeType="1" noTextEdit="1"/>
+              </p:cNvSpPr>
+              <p:nvPr/>
+            </p:nvSpPr>
+            <p:spPr>
+              <a:xfrm>
+                <a:off x="486611" y="2912753"/>
+                <a:ext cx="11218777" cy="563872"/>
+              </a:xfrm>
+              <a:prstGeom prst="rect">
+                <a:avLst/>
+              </a:prstGeom>
+              <a:blipFill>
+                <a:blip r:embed="rId9"/>
+                <a:stretch>
+                  <a:fillRect l="-54" b="-4348"/>
+                </a:stretch>
+              </a:blipFill>
+            </p:spPr>
+            <p:txBody>
+              <a:bodyPr/>
+              <a:lstStyle/>
+              <a:p>
+                <a:r>
+                  <a:rPr lang="en-GB">
+                    <a:noFill/>
+                  </a:rPr>
+                  <a:t> </a:t>
+                </a:r>
+              </a:p>
+            </p:txBody>
+          </p:sp>
+        </mc:Fallback>
+      </mc:AlternateContent>
     </p:spTree>
     <p:extLst>
       <p:ext uri="{BB962C8B-B14F-4D97-AF65-F5344CB8AC3E}">
@@ -4233,6 +5277,36 @@
           <a:chExt cx="0" cy="0"/>
         </a:xfrm>
       </p:grpSpPr>
+      <p:pic>
+        <p:nvPicPr>
+          <p:cNvPr id="9" name="Picture 8">
+            <a:extLst>
+              <a:ext uri="{FF2B5EF4-FFF2-40B4-BE49-F238E27FC236}">
+                <a16:creationId xmlns:a16="http://schemas.microsoft.com/office/drawing/2014/main" id="{D75D8701-9A59-F66A-822E-B7928EA41A2F}"/>
+              </a:ext>
+            </a:extLst>
+          </p:cNvPr>
+          <p:cNvPicPr>
+            <a:picLocks noChangeAspect="1"/>
+          </p:cNvPicPr>
+          <p:nvPr/>
+        </p:nvPicPr>
+        <p:blipFill>
+          <a:blip r:embed="rId2"/>
+          <a:stretch>
+            <a:fillRect/>
+          </a:stretch>
+        </p:blipFill>
+        <p:spPr>
+          <a:xfrm>
+            <a:off x="963405" y="394973"/>
+            <a:ext cx="3752610" cy="2985031"/>
+          </a:xfrm>
+          <a:prstGeom prst="rect">
+            <a:avLst/>
+          </a:prstGeom>
+        </p:spPr>
+      </p:pic>
       <p:sp>
         <p:nvSpPr>
           <p:cNvPr id="2" name="TextBox 1">
@@ -4283,7 +5357,7 @@
           <p:nvPr/>
         </p:nvPicPr>
         <p:blipFill>
-          <a:blip r:embed="rId2"/>
+          <a:blip r:embed="rId3"/>
           <a:stretch>
             <a:fillRect/>
           </a:stretch>
@@ -4300,40 +5374,10 @@
       </p:pic>
       <p:pic>
         <p:nvPicPr>
-          <p:cNvPr id="6" name="Picture 5">
-            <a:extLst>
-              <a:ext uri="{FF2B5EF4-FFF2-40B4-BE49-F238E27FC236}">
-                <a16:creationId xmlns:a16="http://schemas.microsoft.com/office/drawing/2014/main" id="{4BF90D9D-86CA-5E27-D870-335B5926D73E}"/>
-              </a:ext>
-            </a:extLst>
-          </p:cNvPr>
-          <p:cNvPicPr>
-            <a:picLocks noChangeAspect="1"/>
-          </p:cNvPicPr>
-          <p:nvPr/>
-        </p:nvPicPr>
-        <p:blipFill>
-          <a:blip r:embed="rId3"/>
-          <a:stretch>
-            <a:fillRect/>
-          </a:stretch>
-        </p:blipFill>
-        <p:spPr>
-          <a:xfrm>
-            <a:off x="1227667" y="662843"/>
-            <a:ext cx="3507317" cy="2630488"/>
-          </a:xfrm>
-          <a:prstGeom prst="rect">
-            <a:avLst/>
-          </a:prstGeom>
-        </p:spPr>
-      </p:pic>
-      <p:pic>
-        <p:nvPicPr>
-          <p:cNvPr id="8" name="Picture 7">
-            <a:extLst>
-              <a:ext uri="{FF2B5EF4-FFF2-40B4-BE49-F238E27FC236}">
-                <a16:creationId xmlns:a16="http://schemas.microsoft.com/office/drawing/2014/main" id="{DFFA87A0-C6E2-84E6-992F-38B4F95EE4FC}"/>
+          <p:cNvPr id="10" name="Picture 9">
+            <a:extLst>
+              <a:ext uri="{FF2B5EF4-FFF2-40B4-BE49-F238E27FC236}">
+                <a16:creationId xmlns:a16="http://schemas.microsoft.com/office/drawing/2014/main" id="{AFC71321-BF98-2045-A96E-DD9712E32B89}"/>
               </a:ext>
             </a:extLst>
           </p:cNvPr>
@@ -4344,36 +5388,6 @@
         </p:nvPicPr>
         <p:blipFill>
           <a:blip r:embed="rId4"/>
-          <a:stretch>
-            <a:fillRect/>
-          </a:stretch>
-        </p:blipFill>
-        <p:spPr>
-          <a:xfrm>
-            <a:off x="1227667" y="3662663"/>
-            <a:ext cx="3507317" cy="2630488"/>
-          </a:xfrm>
-          <a:prstGeom prst="rect">
-            <a:avLst/>
-          </a:prstGeom>
-        </p:spPr>
-      </p:pic>
-      <p:pic>
-        <p:nvPicPr>
-          <p:cNvPr id="10" name="Picture 9">
-            <a:extLst>
-              <a:ext uri="{FF2B5EF4-FFF2-40B4-BE49-F238E27FC236}">
-                <a16:creationId xmlns:a16="http://schemas.microsoft.com/office/drawing/2014/main" id="{AFC71321-BF98-2045-A96E-DD9712E32B89}"/>
-              </a:ext>
-            </a:extLst>
-          </p:cNvPr>
-          <p:cNvPicPr>
-            <a:picLocks noChangeAspect="1"/>
-          </p:cNvPicPr>
-          <p:nvPr/>
-        </p:nvPicPr>
-        <p:blipFill>
-          <a:blip r:embed="rId5"/>
           <a:stretch>
             <a:fillRect/>
           </a:stretch>
@@ -4403,7 +5417,7 @@
           <p:nvPr/>
         </p:nvPicPr>
         <p:blipFill>
-          <a:blip r:embed="rId6"/>
+          <a:blip r:embed="rId5"/>
           <a:stretch>
             <a:fillRect/>
           </a:stretch>
@@ -4412,6 +5426,36 @@
           <a:xfrm>
             <a:off x="8365067" y="3571020"/>
             <a:ext cx="3826933" cy="2870200"/>
+          </a:xfrm>
+          <a:prstGeom prst="rect">
+            <a:avLst/>
+          </a:prstGeom>
+        </p:spPr>
+      </p:pic>
+      <p:pic>
+        <p:nvPicPr>
+          <p:cNvPr id="13" name="Picture 12">
+            <a:extLst>
+              <a:ext uri="{FF2B5EF4-FFF2-40B4-BE49-F238E27FC236}">
+                <a16:creationId xmlns:a16="http://schemas.microsoft.com/office/drawing/2014/main" id="{2B6F1E71-3306-3687-C556-1BF4C5818C46}"/>
+              </a:ext>
+            </a:extLst>
+          </p:cNvPr>
+          <p:cNvPicPr>
+            <a:picLocks noChangeAspect="1"/>
+          </p:cNvPicPr>
+          <p:nvPr/>
+        </p:nvPicPr>
+        <p:blipFill>
+          <a:blip r:embed="rId6"/>
+          <a:stretch>
+            <a:fillRect/>
+          </a:stretch>
+        </p:blipFill>
+        <p:spPr>
+          <a:xfrm>
+            <a:off x="985071" y="3637716"/>
+            <a:ext cx="3847659" cy="3060638"/>
           </a:xfrm>
           <a:prstGeom prst="rect">
             <a:avLst/>
@@ -4454,6 +5498,36 @@
           <a:chExt cx="0" cy="0"/>
         </a:xfrm>
       </p:grpSpPr>
+      <p:pic>
+        <p:nvPicPr>
+          <p:cNvPr id="6" name="Picture 5">
+            <a:extLst>
+              <a:ext uri="{FF2B5EF4-FFF2-40B4-BE49-F238E27FC236}">
+                <a16:creationId xmlns:a16="http://schemas.microsoft.com/office/drawing/2014/main" id="{AA5D3E04-0B03-4F36-4692-AE76A6F511B8}"/>
+              </a:ext>
+            </a:extLst>
+          </p:cNvPr>
+          <p:cNvPicPr>
+            <a:picLocks noChangeAspect="1"/>
+          </p:cNvPicPr>
+          <p:nvPr/>
+        </p:nvPicPr>
+        <p:blipFill>
+          <a:blip r:embed="rId2"/>
+          <a:stretch>
+            <a:fillRect/>
+          </a:stretch>
+        </p:blipFill>
+        <p:spPr>
+          <a:xfrm>
+            <a:off x="445491" y="446310"/>
+            <a:ext cx="4011218" cy="3190741"/>
+          </a:xfrm>
+          <a:prstGeom prst="rect">
+            <a:avLst/>
+          </a:prstGeom>
+        </p:spPr>
+      </p:pic>
       <p:sp>
         <p:nvSpPr>
           <p:cNvPr id="2" name="TextBox 1">
@@ -4504,7 +5578,7 @@
           <p:nvPr/>
         </p:nvPicPr>
         <p:blipFill>
-          <a:blip r:embed="rId2"/>
+          <a:blip r:embed="rId3"/>
           <a:stretch>
             <a:fillRect/>
           </a:stretch>
@@ -4534,7 +5608,7 @@
           <p:nvPr/>
         </p:nvPicPr>
         <p:blipFill>
-          <a:blip r:embed="rId3"/>
+          <a:blip r:embed="rId4"/>
           <a:stretch>
             <a:fillRect/>
           </a:stretch>
@@ -4564,7 +5638,7 @@
           <p:nvPr/>
         </p:nvPicPr>
         <p:blipFill>
-          <a:blip r:embed="rId4"/>
+          <a:blip r:embed="rId5"/>
           <a:stretch>
             <a:fillRect/>
           </a:stretch>
@@ -4581,40 +5655,10 @@
       </p:pic>
       <p:pic>
         <p:nvPicPr>
-          <p:cNvPr id="5" name="Picture 4">
-            <a:extLst>
-              <a:ext uri="{FF2B5EF4-FFF2-40B4-BE49-F238E27FC236}">
-                <a16:creationId xmlns:a16="http://schemas.microsoft.com/office/drawing/2014/main" id="{DD97B197-87AF-FC6C-435C-BA9995BCF137}"/>
-              </a:ext>
-            </a:extLst>
-          </p:cNvPr>
-          <p:cNvPicPr>
-            <a:picLocks noChangeAspect="1"/>
-          </p:cNvPicPr>
-          <p:nvPr/>
-        </p:nvPicPr>
-        <p:blipFill>
-          <a:blip r:embed="rId5"/>
-          <a:stretch>
-            <a:fillRect/>
-          </a:stretch>
-        </p:blipFill>
-        <p:spPr>
-          <a:xfrm>
-            <a:off x="482600" y="745331"/>
-            <a:ext cx="3657600" cy="2743200"/>
-          </a:xfrm>
-          <a:prstGeom prst="rect">
-            <a:avLst/>
-          </a:prstGeom>
-        </p:spPr>
-      </p:pic>
-      <p:pic>
-        <p:nvPicPr>
-          <p:cNvPr id="9" name="Picture 8">
-            <a:extLst>
-              <a:ext uri="{FF2B5EF4-FFF2-40B4-BE49-F238E27FC236}">
-                <a16:creationId xmlns:a16="http://schemas.microsoft.com/office/drawing/2014/main" id="{6B2194D7-FCC9-8CFB-727A-847C42D1F553}"/>
+          <p:cNvPr id="8" name="Picture 7">
+            <a:extLst>
+              <a:ext uri="{FF2B5EF4-FFF2-40B4-BE49-F238E27FC236}">
+                <a16:creationId xmlns:a16="http://schemas.microsoft.com/office/drawing/2014/main" id="{5B978444-03C3-A30C-ED76-DD98758956D7}"/>
               </a:ext>
             </a:extLst>
           </p:cNvPr>
@@ -4631,8 +5675,8 @@
         </p:blipFill>
         <p:spPr>
           <a:xfrm>
-            <a:off x="482600" y="3712947"/>
-            <a:ext cx="3937000" cy="2952750"/>
+            <a:off x="445492" y="3637051"/>
+            <a:ext cx="4011217" cy="3190741"/>
           </a:xfrm>
           <a:prstGeom prst="rect">
             <a:avLst/>

</xml_diff>

<commit_message>
updated Theory-Experiment comparison with spaghetti plots for different Jerome simulations. Also code to make these plots
</commit_message>
<xml_diff>
--- a/Data/DFT2025/TheoryExperComparison.pptx
+++ b/Data/DFT2025/TheoryExperComparison.pptx
@@ -9,6 +9,8 @@
     <p:sldId id="257" r:id="rId3"/>
     <p:sldId id="258" r:id="rId4"/>
     <p:sldId id="259" r:id="rId5"/>
+    <p:sldId id="260" r:id="rId6"/>
+    <p:sldId id="261" r:id="rId7"/>
   </p:sldIdLst>
   <p:sldSz cx="12192000" cy="6858000"/>
   <p:notesSz cx="6858000" cy="9144000"/>
@@ -264,7 +266,7 @@
           <a:p>
             <a:fld id="{CCA5D086-41C3-45A3-9AA5-B506825A19E0}" type="datetimeFigureOut">
               <a:rPr lang="en-GB" smtClean="0"/>
-              <a:t>04/12/2025</a:t>
+              <a:t>05/12/2025</a:t>
             </a:fld>
             <a:endParaRPr lang="en-GB"/>
           </a:p>
@@ -464,7 +466,7 @@
           <a:p>
             <a:fld id="{CCA5D086-41C3-45A3-9AA5-B506825A19E0}" type="datetimeFigureOut">
               <a:rPr lang="en-GB" smtClean="0"/>
-              <a:t>04/12/2025</a:t>
+              <a:t>05/12/2025</a:t>
             </a:fld>
             <a:endParaRPr lang="en-GB"/>
           </a:p>
@@ -674,7 +676,7 @@
           <a:p>
             <a:fld id="{CCA5D086-41C3-45A3-9AA5-B506825A19E0}" type="datetimeFigureOut">
               <a:rPr lang="en-GB" smtClean="0"/>
-              <a:t>04/12/2025</a:t>
+              <a:t>05/12/2025</a:t>
             </a:fld>
             <a:endParaRPr lang="en-GB"/>
           </a:p>
@@ -874,7 +876,7 @@
           <a:p>
             <a:fld id="{CCA5D086-41C3-45A3-9AA5-B506825A19E0}" type="datetimeFigureOut">
               <a:rPr lang="en-GB" smtClean="0"/>
-              <a:t>04/12/2025</a:t>
+              <a:t>05/12/2025</a:t>
             </a:fld>
             <a:endParaRPr lang="en-GB"/>
           </a:p>
@@ -1150,7 +1152,7 @@
           <a:p>
             <a:fld id="{CCA5D086-41C3-45A3-9AA5-B506825A19E0}" type="datetimeFigureOut">
               <a:rPr lang="en-GB" smtClean="0"/>
-              <a:t>04/12/2025</a:t>
+              <a:t>05/12/2025</a:t>
             </a:fld>
             <a:endParaRPr lang="en-GB"/>
           </a:p>
@@ -1418,7 +1420,7 @@
           <a:p>
             <a:fld id="{CCA5D086-41C3-45A3-9AA5-B506825A19E0}" type="datetimeFigureOut">
               <a:rPr lang="en-GB" smtClean="0"/>
-              <a:t>04/12/2025</a:t>
+              <a:t>05/12/2025</a:t>
             </a:fld>
             <a:endParaRPr lang="en-GB"/>
           </a:p>
@@ -1833,7 +1835,7 @@
           <a:p>
             <a:fld id="{CCA5D086-41C3-45A3-9AA5-B506825A19E0}" type="datetimeFigureOut">
               <a:rPr lang="en-GB" smtClean="0"/>
-              <a:t>04/12/2025</a:t>
+              <a:t>05/12/2025</a:t>
             </a:fld>
             <a:endParaRPr lang="en-GB"/>
           </a:p>
@@ -1975,7 +1977,7 @@
           <a:p>
             <a:fld id="{CCA5D086-41C3-45A3-9AA5-B506825A19E0}" type="datetimeFigureOut">
               <a:rPr lang="en-GB" smtClean="0"/>
-              <a:t>04/12/2025</a:t>
+              <a:t>05/12/2025</a:t>
             </a:fld>
             <a:endParaRPr lang="en-GB"/>
           </a:p>
@@ -2088,7 +2090,7 @@
           <a:p>
             <a:fld id="{CCA5D086-41C3-45A3-9AA5-B506825A19E0}" type="datetimeFigureOut">
               <a:rPr lang="en-GB" smtClean="0"/>
-              <a:t>04/12/2025</a:t>
+              <a:t>05/12/2025</a:t>
             </a:fld>
             <a:endParaRPr lang="en-GB"/>
           </a:p>
@@ -2401,7 +2403,7 @@
           <a:p>
             <a:fld id="{CCA5D086-41C3-45A3-9AA5-B506825A19E0}" type="datetimeFigureOut">
               <a:rPr lang="en-GB" smtClean="0"/>
-              <a:t>04/12/2025</a:t>
+              <a:t>05/12/2025</a:t>
             </a:fld>
             <a:endParaRPr lang="en-GB"/>
           </a:p>
@@ -2690,7 +2692,7 @@
           <a:p>
             <a:fld id="{CCA5D086-41C3-45A3-9AA5-B506825A19E0}" type="datetimeFigureOut">
               <a:rPr lang="en-GB" smtClean="0"/>
-              <a:t>04/12/2025</a:t>
+              <a:t>05/12/2025</a:t>
             </a:fld>
             <a:endParaRPr lang="en-GB"/>
           </a:p>
@@ -2933,7 +2935,7 @@
           <a:p>
             <a:fld id="{CCA5D086-41C3-45A3-9AA5-B506825A19E0}" type="datetimeFigureOut">
               <a:rPr lang="en-GB" smtClean="0"/>
-              <a:t>04/12/2025</a:t>
+              <a:t>05/12/2025</a:t>
             </a:fld>
             <a:endParaRPr lang="en-GB"/>
           </a:p>
@@ -3759,145 +3761,6 @@
           </a:p>
         </p:txBody>
       </p:sp>
-      <mc:AlternateContent xmlns:mc="http://schemas.openxmlformats.org/markup-compatibility/2006" xmlns:a14="http://schemas.microsoft.com/office/drawing/2010/main">
-        <mc:Choice Requires="a14">
-          <p:sp>
-            <p:nvSpPr>
-              <p:cNvPr id="22" name="TextBox 21">
-                <a:extLst>
-                  <a:ext uri="{FF2B5EF4-FFF2-40B4-BE49-F238E27FC236}">
-                    <a16:creationId xmlns:a16="http://schemas.microsoft.com/office/drawing/2014/main" id="{46C0DC79-CBEF-BA7C-3065-0E67BA057E7C}"/>
-                  </a:ext>
-                </a:extLst>
-              </p:cNvPr>
-              <p:cNvSpPr txBox="1"/>
-              <p:nvPr/>
-            </p:nvSpPr>
-            <p:spPr>
-              <a:xfrm>
-                <a:off x="636924" y="163274"/>
-                <a:ext cx="484428" cy="369332"/>
-              </a:xfrm>
-              <a:prstGeom prst="rect">
-                <a:avLst/>
-              </a:prstGeom>
-              <a:noFill/>
-            </p:spPr>
-            <p:txBody>
-              <a:bodyPr wrap="none" rtlCol="0">
-                <a:spAutoFit/>
-              </a:bodyPr>
-              <a:lstStyle/>
-              <a:p>
-                <a:pPr/>
-                <a14:m>
-                  <m:oMathPara xmlns:m="http://schemas.openxmlformats.org/officeDocument/2006/math">
-                    <m:oMathParaPr>
-                      <m:jc m:val="centerGroup"/>
-                    </m:oMathParaPr>
-                    <m:oMath xmlns:m="http://schemas.openxmlformats.org/officeDocument/2006/math">
-                      <m:r>
-                        <a:rPr lang="en-GB" i="1" smtClean="0">
-                          <a:latin typeface="Cambria Math" panose="02040503050406030204" pitchFamily="18" charset="0"/>
-                          <a:ea typeface="Cambria Math" panose="02040503050406030204" pitchFamily="18" charset="0"/>
-                        </a:rPr>
-                        <m:t>𝜒</m:t>
-                      </m:r>
-                      <m:r>
-                        <a:rPr lang="en-GB" b="0" i="1" smtClean="0">
-                          <a:latin typeface="Cambria Math" panose="02040503050406030204" pitchFamily="18" charset="0"/>
-                          <a:ea typeface="Cambria Math" panose="02040503050406030204" pitchFamily="18" charset="0"/>
-                        </a:rPr>
-                        <m:t>′′</m:t>
-                      </m:r>
-                    </m:oMath>
-                  </m:oMathPara>
-                </a14:m>
-                <a:endParaRPr lang="en-GB" dirty="0"/>
-              </a:p>
-            </p:txBody>
-          </p:sp>
-        </mc:Choice>
-        <mc:Fallback xmlns="">
-          <p:sp>
-            <p:nvSpPr>
-              <p:cNvPr id="22" name="TextBox 21">
-                <a:extLst>
-                  <a:ext uri="{FF2B5EF4-FFF2-40B4-BE49-F238E27FC236}">
-                    <a16:creationId xmlns:a16="http://schemas.microsoft.com/office/drawing/2014/main" id="{46C0DC79-CBEF-BA7C-3065-0E67BA057E7C}"/>
-                  </a:ext>
-                </a:extLst>
-              </p:cNvPr>
-              <p:cNvSpPr txBox="1">
-                <a:spLocks noRot="1" noChangeAspect="1" noMove="1" noResize="1" noEditPoints="1" noAdjustHandles="1" noChangeArrowheads="1" noChangeShapeType="1" noTextEdit="1"/>
-              </p:cNvSpPr>
-              <p:nvPr/>
-            </p:nvSpPr>
-            <p:spPr>
-              <a:xfrm>
-                <a:off x="636924" y="163274"/>
-                <a:ext cx="484428" cy="369332"/>
-              </a:xfrm>
-              <a:prstGeom prst="rect">
-                <a:avLst/>
-              </a:prstGeom>
-              <a:blipFill>
-                <a:blip r:embed="rId7"/>
-                <a:stretch>
-                  <a:fillRect b="-5000"/>
-                </a:stretch>
-              </a:blipFill>
-            </p:spPr>
-            <p:txBody>
-              <a:bodyPr/>
-              <a:lstStyle/>
-              <a:p>
-                <a:r>
-                  <a:rPr lang="en-GB">
-                    <a:noFill/>
-                  </a:rPr>
-                  <a:t> </a:t>
-                </a:r>
-              </a:p>
-            </p:txBody>
-          </p:sp>
-        </mc:Fallback>
-      </mc:AlternateContent>
-      <p:sp>
-        <p:nvSpPr>
-          <p:cNvPr id="23" name="TextBox 22">
-            <a:extLst>
-              <a:ext uri="{FF2B5EF4-FFF2-40B4-BE49-F238E27FC236}">
-                <a16:creationId xmlns:a16="http://schemas.microsoft.com/office/drawing/2014/main" id="{17090720-095D-D6F5-8571-A86F35C12040}"/>
-              </a:ext>
-            </a:extLst>
-          </p:cNvPr>
-          <p:cNvSpPr txBox="1"/>
-          <p:nvPr/>
-        </p:nvSpPr>
-        <p:spPr>
-          <a:xfrm>
-            <a:off x="1182014" y="184666"/>
-            <a:ext cx="1940275" cy="369332"/>
-          </a:xfrm>
-          <a:prstGeom prst="rect">
-            <a:avLst/>
-          </a:prstGeom>
-          <a:noFill/>
-        </p:spPr>
-        <p:txBody>
-          <a:bodyPr wrap="none" rtlCol="0">
-            <a:spAutoFit/>
-          </a:bodyPr>
-          <a:lstStyle/>
-          <a:p>
-            <a:r>
-              <a:rPr lang="en-GB" dirty="0"/>
-              <a:t>As read from data</a:t>
-            </a:r>
-          </a:p>
-        </p:txBody>
-      </p:sp>
       <p:sp>
         <p:nvSpPr>
           <p:cNvPr id="24" name="TextBox 23">
@@ -3934,6 +3797,36 @@
           </a:p>
         </p:txBody>
       </p:sp>
+      <p:pic>
+        <p:nvPicPr>
+          <p:cNvPr id="2" name="Picture 1">
+            <a:extLst>
+              <a:ext uri="{FF2B5EF4-FFF2-40B4-BE49-F238E27FC236}">
+                <a16:creationId xmlns:a16="http://schemas.microsoft.com/office/drawing/2014/main" id="{4FCC9271-041E-4A9A-7CBF-142CDA0D51F0}"/>
+              </a:ext>
+            </a:extLst>
+          </p:cNvPr>
+          <p:cNvPicPr>
+            <a:picLocks noChangeAspect="1"/>
+          </p:cNvPicPr>
+          <p:nvPr/>
+        </p:nvPicPr>
+        <p:blipFill>
+          <a:blip r:embed="rId7"/>
+          <a:stretch>
+            <a:fillRect/>
+          </a:stretch>
+        </p:blipFill>
+        <p:spPr>
+          <a:xfrm>
+            <a:off x="322158" y="609600"/>
+            <a:ext cx="3511146" cy="2794000"/>
+          </a:xfrm>
+          <a:prstGeom prst="rect">
+            <a:avLst/>
+          </a:prstGeom>
+        </p:spPr>
+      </p:pic>
     </p:spTree>
     <p:extLst>
       <p:ext uri="{BB962C8B-B14F-4D97-AF65-F5344CB8AC3E}">
@@ -4209,8 +4102,8 @@
           </a:prstGeom>
         </p:spPr>
       </p:pic>
-      <mc:AlternateContent xmlns:mc="http://schemas.openxmlformats.org/markup-compatibility/2006">
-        <mc:Choice xmlns:a14="http://schemas.microsoft.com/office/drawing/2010/main" Requires="a14">
+      <mc:AlternateContent xmlns:mc="http://schemas.openxmlformats.org/markup-compatibility/2006" xmlns:a14="http://schemas.microsoft.com/office/drawing/2010/main">
+        <mc:Choice Requires="a14">
           <p:sp>
             <p:nvSpPr>
               <p:cNvPr id="9" name="TextBox 8">
@@ -5202,7 +5095,7 @@
             </p:txBody>
           </p:sp>
         </mc:Choice>
-        <mc:Fallback>
+        <mc:Fallback xmlns="">
           <p:sp>
             <p:nvSpPr>
               <p:cNvPr id="9" name="TextBox 8">
@@ -5229,6 +5122,112 @@
                 <a:blip r:embed="rId9"/>
                 <a:stretch>
                   <a:fillRect l="-54" b="-4348"/>
+                </a:stretch>
+              </a:blipFill>
+            </p:spPr>
+            <p:txBody>
+              <a:bodyPr/>
+              <a:lstStyle/>
+              <a:p>
+                <a:r>
+                  <a:rPr lang="en-GB">
+                    <a:noFill/>
+                  </a:rPr>
+                  <a:t> </a:t>
+                </a:r>
+              </a:p>
+            </p:txBody>
+          </p:sp>
+        </mc:Fallback>
+      </mc:AlternateContent>
+      <mc:AlternateContent xmlns:mc="http://schemas.openxmlformats.org/markup-compatibility/2006" xmlns:a14="http://schemas.microsoft.com/office/drawing/2010/main">
+        <mc:Choice Requires="a14">
+          <p:sp>
+            <p:nvSpPr>
+              <p:cNvPr id="4" name="TextBox 3">
+                <a:extLst>
+                  <a:ext uri="{FF2B5EF4-FFF2-40B4-BE49-F238E27FC236}">
+                    <a16:creationId xmlns:a16="http://schemas.microsoft.com/office/drawing/2014/main" id="{6CA9AD3E-1411-FB2D-9ABF-9269C6561508}"/>
+                  </a:ext>
+                </a:extLst>
+              </p:cNvPr>
+              <p:cNvSpPr txBox="1"/>
+              <p:nvPr/>
+            </p:nvSpPr>
+            <p:spPr>
+              <a:xfrm>
+                <a:off x="535486" y="2254757"/>
+                <a:ext cx="3591839" cy="276999"/>
+              </a:xfrm>
+              <a:prstGeom prst="rect">
+                <a:avLst/>
+              </a:prstGeom>
+              <a:noFill/>
+            </p:spPr>
+            <p:txBody>
+              <a:bodyPr wrap="square" lIns="0" tIns="0" rIns="0" bIns="0" rtlCol="0">
+                <a:spAutoFit/>
+              </a:bodyPr>
+              <a:lstStyle/>
+              <a:p>
+                <a14:m>
+                  <m:oMath xmlns:m="http://schemas.openxmlformats.org/officeDocument/2006/math">
+                    <m:r>
+                      <a:rPr lang="en-GB" b="0" i="1" smtClean="0">
+                        <a:latin typeface="Cambria Math" panose="02040503050406030204" pitchFamily="18" charset="0"/>
+                      </a:rPr>
+                      <m:t>𝑅𝑦</m:t>
+                    </m:r>
+                    <m:r>
+                      <a:rPr lang="en-GB" b="0" i="1" smtClean="0">
+                        <a:latin typeface="Cambria Math" panose="02040503050406030204" pitchFamily="18" charset="0"/>
+                      </a:rPr>
+                      <m:t>=</m:t>
+                    </m:r>
+                    <m:r>
+                      <m:rPr>
+                        <m:nor/>
+                      </m:rPr>
+                      <a:rPr lang="en-GB"/>
+                      <m:t>13605.693</m:t>
+                    </m:r>
+                  </m:oMath>
+                </a14:m>
+                <a:r>
+                  <a:rPr lang="en-GB" dirty="0"/>
+                  <a:t>*meV</a:t>
+                </a:r>
+              </a:p>
+            </p:txBody>
+          </p:sp>
+        </mc:Choice>
+        <mc:Fallback xmlns="">
+          <p:sp>
+            <p:nvSpPr>
+              <p:cNvPr id="4" name="TextBox 3">
+                <a:extLst>
+                  <a:ext uri="{FF2B5EF4-FFF2-40B4-BE49-F238E27FC236}">
+                    <a16:creationId xmlns:a16="http://schemas.microsoft.com/office/drawing/2014/main" id="{6CA9AD3E-1411-FB2D-9ABF-9269C6561508}"/>
+                  </a:ext>
+                </a:extLst>
+              </p:cNvPr>
+              <p:cNvSpPr txBox="1">
+                <a:spLocks noRot="1" noChangeAspect="1" noMove="1" noResize="1" noEditPoints="1" noAdjustHandles="1" noChangeArrowheads="1" noChangeShapeType="1" noTextEdit="1"/>
+              </p:cNvSpPr>
+              <p:nvPr/>
+            </p:nvSpPr>
+            <p:spPr>
+              <a:xfrm>
+                <a:off x="535486" y="2254757"/>
+                <a:ext cx="3591839" cy="276999"/>
+              </a:xfrm>
+              <a:prstGeom prst="rect">
+                <a:avLst/>
+              </a:prstGeom>
+              <a:blipFill>
+                <a:blip r:embed="rId10"/>
+                <a:stretch>
+                  <a:fillRect l="-3056" t="-26667" b="-53333"/>
                 </a:stretch>
               </a:blipFill>
             </p:spPr>
@@ -5687,6 +5686,440 @@
     <p:extLst>
       <p:ext uri="{BB962C8B-B14F-4D97-AF65-F5344CB8AC3E}">
         <p14:creationId xmlns:p14="http://schemas.microsoft.com/office/powerpoint/2010/main" val="3397179586"/>
+      </p:ext>
+    </p:extLst>
+  </p:cSld>
+  <p:clrMapOvr>
+    <a:masterClrMapping/>
+  </p:clrMapOvr>
+</p:sld>
+</file>
+
+<file path=ppt/slides/slide5.xml><?xml version="1.0" encoding="utf-8"?>
+<p:sld xmlns:a="http://schemas.openxmlformats.org/drawingml/2006/main" xmlns:r="http://schemas.openxmlformats.org/officeDocument/2006/relationships" xmlns:p="http://schemas.openxmlformats.org/presentationml/2006/main">
+  <p:cSld>
+    <p:spTree>
+      <p:nvGrpSpPr>
+        <p:cNvPr id="1" name=""/>
+        <p:cNvGrpSpPr/>
+        <p:nvPr/>
+      </p:nvGrpSpPr>
+      <p:grpSpPr>
+        <a:xfrm>
+          <a:off x="0" y="0"/>
+          <a:ext cx="0" cy="0"/>
+          <a:chOff x="0" y="0"/>
+          <a:chExt cx="0" cy="0"/>
+        </a:xfrm>
+      </p:grpSpPr>
+      <p:pic>
+        <p:nvPicPr>
+          <p:cNvPr id="6" name="Picture 5">
+            <a:extLst>
+              <a:ext uri="{FF2B5EF4-FFF2-40B4-BE49-F238E27FC236}">
+                <a16:creationId xmlns:a16="http://schemas.microsoft.com/office/drawing/2014/main" id="{CFC4D49F-E8EA-6260-F122-6575298E7F0C}"/>
+              </a:ext>
+            </a:extLst>
+          </p:cNvPr>
+          <p:cNvPicPr>
+            <a:picLocks noChangeAspect="1"/>
+          </p:cNvPicPr>
+          <p:nvPr/>
+        </p:nvPicPr>
+        <p:blipFill>
+          <a:blip r:embed="rId2"/>
+          <a:stretch>
+            <a:fillRect/>
+          </a:stretch>
+        </p:blipFill>
+        <p:spPr>
+          <a:xfrm>
+            <a:off x="316089" y="327864"/>
+            <a:ext cx="4375087" cy="3240000"/>
+          </a:xfrm>
+          <a:prstGeom prst="rect">
+            <a:avLst/>
+          </a:prstGeom>
+        </p:spPr>
+      </p:pic>
+      <p:pic>
+        <p:nvPicPr>
+          <p:cNvPr id="8" name="Picture 7">
+            <a:extLst>
+              <a:ext uri="{FF2B5EF4-FFF2-40B4-BE49-F238E27FC236}">
+                <a16:creationId xmlns:a16="http://schemas.microsoft.com/office/drawing/2014/main" id="{D90178D1-0597-34AF-BB7A-7BD643E73DE3}"/>
+              </a:ext>
+            </a:extLst>
+          </p:cNvPr>
+          <p:cNvPicPr>
+            <a:picLocks noChangeAspect="1"/>
+          </p:cNvPicPr>
+          <p:nvPr/>
+        </p:nvPicPr>
+        <p:blipFill>
+          <a:blip r:embed="rId3"/>
+          <a:stretch>
+            <a:fillRect/>
+          </a:stretch>
+        </p:blipFill>
+        <p:spPr>
+          <a:xfrm>
+            <a:off x="4691176" y="327864"/>
+            <a:ext cx="4375087" cy="3240000"/>
+          </a:xfrm>
+          <a:prstGeom prst="rect">
+            <a:avLst/>
+          </a:prstGeom>
+        </p:spPr>
+      </p:pic>
+      <p:pic>
+        <p:nvPicPr>
+          <p:cNvPr id="12" name="Picture 11">
+            <a:extLst>
+              <a:ext uri="{FF2B5EF4-FFF2-40B4-BE49-F238E27FC236}">
+                <a16:creationId xmlns:a16="http://schemas.microsoft.com/office/drawing/2014/main" id="{A8242E98-FAB2-F484-D992-7CFBE40FA68E}"/>
+              </a:ext>
+            </a:extLst>
+          </p:cNvPr>
+          <p:cNvPicPr>
+            <a:picLocks noChangeAspect="1"/>
+          </p:cNvPicPr>
+          <p:nvPr/>
+        </p:nvPicPr>
+        <p:blipFill>
+          <a:blip r:embed="rId4"/>
+          <a:stretch>
+            <a:fillRect/>
+          </a:stretch>
+        </p:blipFill>
+        <p:spPr>
+          <a:xfrm>
+            <a:off x="174405" y="3902102"/>
+            <a:ext cx="3363500" cy="2520000"/>
+          </a:xfrm>
+          <a:prstGeom prst="rect">
+            <a:avLst/>
+          </a:prstGeom>
+        </p:spPr>
+      </p:pic>
+      <p:pic>
+        <p:nvPicPr>
+          <p:cNvPr id="14" name="Picture 13">
+            <a:extLst>
+              <a:ext uri="{FF2B5EF4-FFF2-40B4-BE49-F238E27FC236}">
+                <a16:creationId xmlns:a16="http://schemas.microsoft.com/office/drawing/2014/main" id="{BE5354FE-F70F-ABB2-8E31-75DFD8BE1DF7}"/>
+              </a:ext>
+            </a:extLst>
+          </p:cNvPr>
+          <p:cNvPicPr>
+            <a:picLocks noChangeAspect="1"/>
+          </p:cNvPicPr>
+          <p:nvPr/>
+        </p:nvPicPr>
+        <p:blipFill>
+          <a:blip r:embed="rId5"/>
+          <a:stretch>
+            <a:fillRect/>
+          </a:stretch>
+        </p:blipFill>
+        <p:spPr>
+          <a:xfrm>
+            <a:off x="3132289" y="3902102"/>
+            <a:ext cx="3363500" cy="2520000"/>
+          </a:xfrm>
+          <a:prstGeom prst="rect">
+            <a:avLst/>
+          </a:prstGeom>
+        </p:spPr>
+      </p:pic>
+      <p:pic>
+        <p:nvPicPr>
+          <p:cNvPr id="16" name="Picture 15">
+            <a:extLst>
+              <a:ext uri="{FF2B5EF4-FFF2-40B4-BE49-F238E27FC236}">
+                <a16:creationId xmlns:a16="http://schemas.microsoft.com/office/drawing/2014/main" id="{3673CE27-E135-AAB8-9147-C5A7411605F0}"/>
+              </a:ext>
+            </a:extLst>
+          </p:cNvPr>
+          <p:cNvPicPr>
+            <a:picLocks noChangeAspect="1"/>
+          </p:cNvPicPr>
+          <p:nvPr/>
+        </p:nvPicPr>
+        <p:blipFill>
+          <a:blip r:embed="rId6"/>
+          <a:stretch>
+            <a:fillRect/>
+          </a:stretch>
+        </p:blipFill>
+        <p:spPr>
+          <a:xfrm>
+            <a:off x="6090173" y="3902102"/>
+            <a:ext cx="3363500" cy="2520000"/>
+          </a:xfrm>
+          <a:prstGeom prst="rect">
+            <a:avLst/>
+          </a:prstGeom>
+        </p:spPr>
+      </p:pic>
+      <p:cxnSp>
+        <p:nvCxnSpPr>
+          <p:cNvPr id="18" name="Straight Arrow Connector 17">
+            <a:extLst>
+              <a:ext uri="{FF2B5EF4-FFF2-40B4-BE49-F238E27FC236}">
+                <a16:creationId xmlns:a16="http://schemas.microsoft.com/office/drawing/2014/main" id="{9FBE6137-C0D3-BE11-40FD-CA26EC8C8B13}"/>
+              </a:ext>
+            </a:extLst>
+          </p:cNvPr>
+          <p:cNvCxnSpPr>
+            <a:cxnSpLocks/>
+          </p:cNvCxnSpPr>
+          <p:nvPr/>
+        </p:nvCxnSpPr>
+        <p:spPr>
+          <a:xfrm flipV="1">
+            <a:off x="1749287" y="2636520"/>
+            <a:ext cx="574813" cy="2444363"/>
+          </a:xfrm>
+          <a:prstGeom prst="straightConnector1">
+            <a:avLst/>
+          </a:prstGeom>
+          <a:ln>
+            <a:solidFill>
+              <a:srgbClr val="C00000"/>
+            </a:solidFill>
+            <a:tailEnd type="triangle"/>
+          </a:ln>
+        </p:spPr>
+        <p:style>
+          <a:lnRef idx="2">
+            <a:schemeClr val="accent1"/>
+          </a:lnRef>
+          <a:fillRef idx="0">
+            <a:schemeClr val="accent1"/>
+          </a:fillRef>
+          <a:effectRef idx="1">
+            <a:schemeClr val="accent1"/>
+          </a:effectRef>
+          <a:fontRef idx="minor">
+            <a:schemeClr val="tx1"/>
+          </a:fontRef>
+        </p:style>
+      </p:cxnSp>
+      <p:cxnSp>
+        <p:nvCxnSpPr>
+          <p:cNvPr id="20" name="Straight Arrow Connector 19">
+            <a:extLst>
+              <a:ext uri="{FF2B5EF4-FFF2-40B4-BE49-F238E27FC236}">
+                <a16:creationId xmlns:a16="http://schemas.microsoft.com/office/drawing/2014/main" id="{C51B9BFB-A8CF-6807-1BD2-008BE620E4A4}"/>
+              </a:ext>
+            </a:extLst>
+          </p:cNvPr>
+          <p:cNvCxnSpPr>
+            <a:cxnSpLocks/>
+          </p:cNvCxnSpPr>
+          <p:nvPr/>
+        </p:nvCxnSpPr>
+        <p:spPr>
+          <a:xfrm flipH="1" flipV="1">
+            <a:off x="2440788" y="2377440"/>
+            <a:ext cx="4258399" cy="1851660"/>
+          </a:xfrm>
+          <a:prstGeom prst="straightConnector1">
+            <a:avLst/>
+          </a:prstGeom>
+          <a:ln>
+            <a:solidFill>
+              <a:srgbClr val="C00000"/>
+            </a:solidFill>
+            <a:tailEnd type="triangle"/>
+          </a:ln>
+        </p:spPr>
+        <p:style>
+          <a:lnRef idx="2">
+            <a:schemeClr val="accent1"/>
+          </a:lnRef>
+          <a:fillRef idx="0">
+            <a:schemeClr val="accent1"/>
+          </a:fillRef>
+          <a:effectRef idx="1">
+            <a:schemeClr val="accent1"/>
+          </a:effectRef>
+          <a:fontRef idx="minor">
+            <a:schemeClr val="tx1"/>
+          </a:fontRef>
+        </p:style>
+      </p:cxnSp>
+      <p:sp>
+        <p:nvSpPr>
+          <p:cNvPr id="2" name="TextBox 1">
+            <a:extLst>
+              <a:ext uri="{FF2B5EF4-FFF2-40B4-BE49-F238E27FC236}">
+                <a16:creationId xmlns:a16="http://schemas.microsoft.com/office/drawing/2014/main" id="{DC054386-5A80-D094-32BE-093733F58190}"/>
+              </a:ext>
+            </a:extLst>
+          </p:cNvPr>
+          <p:cNvSpPr txBox="1"/>
+          <p:nvPr/>
+        </p:nvSpPr>
+        <p:spPr>
+          <a:xfrm>
+            <a:off x="316089" y="143198"/>
+            <a:ext cx="5779911" cy="369332"/>
+          </a:xfrm>
+          <a:prstGeom prst="rect">
+            <a:avLst/>
+          </a:prstGeom>
+          <a:noFill/>
+        </p:spPr>
+        <p:txBody>
+          <a:bodyPr wrap="square" rtlCol="0">
+            <a:spAutoFit/>
+          </a:bodyPr>
+          <a:lstStyle/>
+          <a:p>
+            <a:r>
+              <a:rPr lang="en-GB" dirty="0"/>
+              <a:t>LDA spaghetti</a:t>
+            </a:r>
+          </a:p>
+        </p:txBody>
+      </p:sp>
+    </p:spTree>
+    <p:extLst>
+      <p:ext uri="{BB962C8B-B14F-4D97-AF65-F5344CB8AC3E}">
+        <p14:creationId xmlns:p14="http://schemas.microsoft.com/office/powerpoint/2010/main" val="1578278517"/>
+      </p:ext>
+    </p:extLst>
+  </p:cSld>
+  <p:clrMapOvr>
+    <a:masterClrMapping/>
+  </p:clrMapOvr>
+</p:sld>
+</file>
+
+<file path=ppt/slides/slide6.xml><?xml version="1.0" encoding="utf-8"?>
+<p:sld xmlns:a="http://schemas.openxmlformats.org/drawingml/2006/main" xmlns:r="http://schemas.openxmlformats.org/officeDocument/2006/relationships" xmlns:p="http://schemas.openxmlformats.org/presentationml/2006/main">
+  <p:cSld>
+    <p:spTree>
+      <p:nvGrpSpPr>
+        <p:cNvPr id="1" name="">
+          <a:extLst>
+            <a:ext uri="{FF2B5EF4-FFF2-40B4-BE49-F238E27FC236}">
+              <a16:creationId xmlns:a16="http://schemas.microsoft.com/office/drawing/2014/main" id="{77F2A21B-052A-058B-EF35-0CD8AA9C881B}"/>
+            </a:ext>
+          </a:extLst>
+        </p:cNvPr>
+        <p:cNvGrpSpPr/>
+        <p:nvPr/>
+      </p:nvGrpSpPr>
+      <p:grpSpPr>
+        <a:xfrm>
+          <a:off x="0" y="0"/>
+          <a:ext cx="0" cy="0"/>
+          <a:chOff x="0" y="0"/>
+          <a:chExt cx="0" cy="0"/>
+        </a:xfrm>
+      </p:grpSpPr>
+      <p:sp>
+        <p:nvSpPr>
+          <p:cNvPr id="2" name="TextBox 1">
+            <a:extLst>
+              <a:ext uri="{FF2B5EF4-FFF2-40B4-BE49-F238E27FC236}">
+                <a16:creationId xmlns:a16="http://schemas.microsoft.com/office/drawing/2014/main" id="{F7F7E3CA-16CD-59FE-3F33-4A7EAD0C7A05}"/>
+              </a:ext>
+            </a:extLst>
+          </p:cNvPr>
+          <p:cNvSpPr txBox="1"/>
+          <p:nvPr/>
+        </p:nvSpPr>
+        <p:spPr>
+          <a:xfrm>
+            <a:off x="316089" y="143198"/>
+            <a:ext cx="5779911" cy="369332"/>
+          </a:xfrm>
+          <a:prstGeom prst="rect">
+            <a:avLst/>
+          </a:prstGeom>
+          <a:noFill/>
+        </p:spPr>
+        <p:txBody>
+          <a:bodyPr wrap="square" rtlCol="0">
+            <a:spAutoFit/>
+          </a:bodyPr>
+          <a:lstStyle/>
+          <a:p>
+            <a:r>
+              <a:rPr lang="en-GB" dirty="0"/>
+              <a:t> GSGW spaghetti</a:t>
+            </a:r>
+          </a:p>
+        </p:txBody>
+      </p:sp>
+      <p:pic>
+        <p:nvPicPr>
+          <p:cNvPr id="4" name="Picture 3">
+            <a:extLst>
+              <a:ext uri="{FF2B5EF4-FFF2-40B4-BE49-F238E27FC236}">
+                <a16:creationId xmlns:a16="http://schemas.microsoft.com/office/drawing/2014/main" id="{69FE3F33-5EEB-3C03-7529-A4BF61E0557B}"/>
+              </a:ext>
+            </a:extLst>
+          </p:cNvPr>
+          <p:cNvPicPr>
+            <a:picLocks noChangeAspect="1"/>
+          </p:cNvPicPr>
+          <p:nvPr/>
+        </p:nvPicPr>
+        <p:blipFill>
+          <a:blip r:embed="rId2"/>
+          <a:stretch>
+            <a:fillRect/>
+          </a:stretch>
+        </p:blipFill>
+        <p:spPr>
+          <a:xfrm>
+            <a:off x="144780" y="674336"/>
+            <a:ext cx="5334000" cy="4000500"/>
+          </a:xfrm>
+          <a:prstGeom prst="rect">
+            <a:avLst/>
+          </a:prstGeom>
+        </p:spPr>
+      </p:pic>
+      <p:pic>
+        <p:nvPicPr>
+          <p:cNvPr id="7" name="Picture 6">
+            <a:extLst>
+              <a:ext uri="{FF2B5EF4-FFF2-40B4-BE49-F238E27FC236}">
+                <a16:creationId xmlns:a16="http://schemas.microsoft.com/office/drawing/2014/main" id="{CC402F69-B364-94B0-D38C-2B671EF922A5}"/>
+              </a:ext>
+            </a:extLst>
+          </p:cNvPr>
+          <p:cNvPicPr>
+            <a:picLocks noChangeAspect="1"/>
+          </p:cNvPicPr>
+          <p:nvPr/>
+        </p:nvPicPr>
+        <p:blipFill>
+          <a:blip r:embed="rId3"/>
+          <a:stretch>
+            <a:fillRect/>
+          </a:stretch>
+        </p:blipFill>
+        <p:spPr>
+          <a:xfrm>
+            <a:off x="5608864" y="674336"/>
+            <a:ext cx="5334000" cy="4000500"/>
+          </a:xfrm>
+          <a:prstGeom prst="rect">
+            <a:avLst/>
+          </a:prstGeom>
+        </p:spPr>
+      </p:pic>
+    </p:spTree>
+    <p:extLst>
+      <p:ext uri="{BB962C8B-B14F-4D97-AF65-F5344CB8AC3E}">
+        <p14:creationId xmlns:p14="http://schemas.microsoft.com/office/powerpoint/2010/main" val="1344474539"/>
       </p:ext>
     </p:extLst>
   </p:cSld>

</xml_diff>

<commit_message>
working comparison scripts between linear Spin Wave theory and DFT
</commit_message>
<xml_diff>
--- a/Data/DFT2025/TheoryExperComparison.pptx
+++ b/Data/DFT2025/TheoryExperComparison.pptx
@@ -4,6 +4,9 @@
   <p:sldMasterIdLst>
     <p:sldMasterId id="2147483648" r:id="rId1"/>
   </p:sldMasterIdLst>
+  <p:notesMasterIdLst>
+    <p:notesMasterId r:id="rId8"/>
+  </p:notesMasterIdLst>
   <p:sldIdLst>
     <p:sldId id="256" r:id="rId2"/>
     <p:sldId id="257" r:id="rId3"/>
@@ -117,6 +120,440 @@
 </p:presentation>
 </file>
 
+<file path=ppt/notesMasters/notesMaster1.xml><?xml version="1.0" encoding="utf-8"?>
+<p:notesMaster xmlns:a="http://schemas.openxmlformats.org/drawingml/2006/main" xmlns:r="http://schemas.openxmlformats.org/officeDocument/2006/relationships" xmlns:p="http://schemas.openxmlformats.org/presentationml/2006/main">
+  <p:cSld>
+    <p:bg>
+      <p:bgRef idx="1001">
+        <a:schemeClr val="bg1"/>
+      </p:bgRef>
+    </p:bg>
+    <p:spTree>
+      <p:nvGrpSpPr>
+        <p:cNvPr id="1" name=""/>
+        <p:cNvGrpSpPr/>
+        <p:nvPr/>
+      </p:nvGrpSpPr>
+      <p:grpSpPr>
+        <a:xfrm>
+          <a:off x="0" y="0"/>
+          <a:ext cx="0" cy="0"/>
+          <a:chOff x="0" y="0"/>
+          <a:chExt cx="0" cy="0"/>
+        </a:xfrm>
+      </p:grpSpPr>
+      <p:sp>
+        <p:nvSpPr>
+          <p:cNvPr id="2" name="Header Placeholder 1"/>
+          <p:cNvSpPr>
+            <a:spLocks noGrp="1"/>
+          </p:cNvSpPr>
+          <p:nvPr>
+            <p:ph type="hdr" sz="quarter"/>
+          </p:nvPr>
+        </p:nvSpPr>
+        <p:spPr>
+          <a:xfrm>
+            <a:off x="0" y="0"/>
+            <a:ext cx="2971800" cy="458788"/>
+          </a:xfrm>
+          <a:prstGeom prst="rect">
+            <a:avLst/>
+          </a:prstGeom>
+        </p:spPr>
+        <p:txBody>
+          <a:bodyPr vert="horz" lIns="91440" tIns="45720" rIns="91440" bIns="45720" rtlCol="0"/>
+          <a:lstStyle>
+            <a:lvl1pPr algn="l">
+              <a:defRPr sz="1200"/>
+            </a:lvl1pPr>
+          </a:lstStyle>
+          <a:p>
+            <a:endParaRPr lang="en-GB"/>
+          </a:p>
+        </p:txBody>
+      </p:sp>
+      <p:sp>
+        <p:nvSpPr>
+          <p:cNvPr id="3" name="Date Placeholder 2"/>
+          <p:cNvSpPr>
+            <a:spLocks noGrp="1"/>
+          </p:cNvSpPr>
+          <p:nvPr>
+            <p:ph type="dt" idx="1"/>
+          </p:nvPr>
+        </p:nvSpPr>
+        <p:spPr>
+          <a:xfrm>
+            <a:off x="3884613" y="0"/>
+            <a:ext cx="2971800" cy="458788"/>
+          </a:xfrm>
+          <a:prstGeom prst="rect">
+            <a:avLst/>
+          </a:prstGeom>
+        </p:spPr>
+        <p:txBody>
+          <a:bodyPr vert="horz" lIns="91440" tIns="45720" rIns="91440" bIns="45720" rtlCol="0"/>
+          <a:lstStyle>
+            <a:lvl1pPr algn="r">
+              <a:defRPr sz="1200"/>
+            </a:lvl1pPr>
+          </a:lstStyle>
+          <a:p>
+            <a:fld id="{60BF5196-8AA5-4443-BAE3-5928F0EB750E}" type="datetimeFigureOut">
+              <a:rPr lang="en-GB" smtClean="0"/>
+              <a:t>15/12/2025</a:t>
+            </a:fld>
+            <a:endParaRPr lang="en-GB"/>
+          </a:p>
+        </p:txBody>
+      </p:sp>
+      <p:sp>
+        <p:nvSpPr>
+          <p:cNvPr id="4" name="Slide Image Placeholder 3"/>
+          <p:cNvSpPr>
+            <a:spLocks noGrp="1" noRot="1" noChangeAspect="1"/>
+          </p:cNvSpPr>
+          <p:nvPr>
+            <p:ph type="sldImg" idx="2"/>
+          </p:nvPr>
+        </p:nvSpPr>
+        <p:spPr>
+          <a:xfrm>
+            <a:off x="685800" y="1143000"/>
+            <a:ext cx="5486400" cy="3086100"/>
+          </a:xfrm>
+          <a:prstGeom prst="rect">
+            <a:avLst/>
+          </a:prstGeom>
+          <a:noFill/>
+          <a:ln w="12700">
+            <a:solidFill>
+              <a:prstClr val="black"/>
+            </a:solidFill>
+          </a:ln>
+        </p:spPr>
+        <p:txBody>
+          <a:bodyPr vert="horz" lIns="91440" tIns="45720" rIns="91440" bIns="45720" rtlCol="0" anchor="ctr"/>
+          <a:lstStyle/>
+          <a:p>
+            <a:endParaRPr lang="en-GB"/>
+          </a:p>
+        </p:txBody>
+      </p:sp>
+      <p:sp>
+        <p:nvSpPr>
+          <p:cNvPr id="5" name="Notes Placeholder 4"/>
+          <p:cNvSpPr>
+            <a:spLocks noGrp="1"/>
+          </p:cNvSpPr>
+          <p:nvPr>
+            <p:ph type="body" sz="quarter" idx="3"/>
+          </p:nvPr>
+        </p:nvSpPr>
+        <p:spPr>
+          <a:xfrm>
+            <a:off x="685800" y="4400550"/>
+            <a:ext cx="5486400" cy="3600450"/>
+          </a:xfrm>
+          <a:prstGeom prst="rect">
+            <a:avLst/>
+          </a:prstGeom>
+        </p:spPr>
+        <p:txBody>
+          <a:bodyPr vert="horz" lIns="91440" tIns="45720" rIns="91440" bIns="45720" rtlCol="0"/>
+          <a:lstStyle/>
+          <a:p>
+            <a:pPr lvl="0"/>
+            <a:r>
+              <a:rPr lang="en-US"/>
+              <a:t>Click to edit Master text styles</a:t>
+            </a:r>
+          </a:p>
+          <a:p>
+            <a:pPr lvl="1"/>
+            <a:r>
+              <a:rPr lang="en-US"/>
+              <a:t>Second level</a:t>
+            </a:r>
+          </a:p>
+          <a:p>
+            <a:pPr lvl="2"/>
+            <a:r>
+              <a:rPr lang="en-US"/>
+              <a:t>Third level</a:t>
+            </a:r>
+          </a:p>
+          <a:p>
+            <a:pPr lvl="3"/>
+            <a:r>
+              <a:rPr lang="en-US"/>
+              <a:t>Fourth level</a:t>
+            </a:r>
+          </a:p>
+          <a:p>
+            <a:pPr lvl="4"/>
+            <a:r>
+              <a:rPr lang="en-US"/>
+              <a:t>Fifth level</a:t>
+            </a:r>
+            <a:endParaRPr lang="en-GB"/>
+          </a:p>
+        </p:txBody>
+      </p:sp>
+      <p:sp>
+        <p:nvSpPr>
+          <p:cNvPr id="6" name="Footer Placeholder 5"/>
+          <p:cNvSpPr>
+            <a:spLocks noGrp="1"/>
+          </p:cNvSpPr>
+          <p:nvPr>
+            <p:ph type="ftr" sz="quarter" idx="4"/>
+          </p:nvPr>
+        </p:nvSpPr>
+        <p:spPr>
+          <a:xfrm>
+            <a:off x="0" y="8685213"/>
+            <a:ext cx="2971800" cy="458787"/>
+          </a:xfrm>
+          <a:prstGeom prst="rect">
+            <a:avLst/>
+          </a:prstGeom>
+        </p:spPr>
+        <p:txBody>
+          <a:bodyPr vert="horz" lIns="91440" tIns="45720" rIns="91440" bIns="45720" rtlCol="0" anchor="b"/>
+          <a:lstStyle>
+            <a:lvl1pPr algn="l">
+              <a:defRPr sz="1200"/>
+            </a:lvl1pPr>
+          </a:lstStyle>
+          <a:p>
+            <a:endParaRPr lang="en-GB"/>
+          </a:p>
+        </p:txBody>
+      </p:sp>
+      <p:sp>
+        <p:nvSpPr>
+          <p:cNvPr id="7" name="Slide Number Placeholder 6"/>
+          <p:cNvSpPr>
+            <a:spLocks noGrp="1"/>
+          </p:cNvSpPr>
+          <p:nvPr>
+            <p:ph type="sldNum" sz="quarter" idx="5"/>
+          </p:nvPr>
+        </p:nvSpPr>
+        <p:spPr>
+          <a:xfrm>
+            <a:off x="3884613" y="8685213"/>
+            <a:ext cx="2971800" cy="458787"/>
+          </a:xfrm>
+          <a:prstGeom prst="rect">
+            <a:avLst/>
+          </a:prstGeom>
+        </p:spPr>
+        <p:txBody>
+          <a:bodyPr vert="horz" lIns="91440" tIns="45720" rIns="91440" bIns="45720" rtlCol="0" anchor="b"/>
+          <a:lstStyle>
+            <a:lvl1pPr algn="r">
+              <a:defRPr sz="1200"/>
+            </a:lvl1pPr>
+          </a:lstStyle>
+          <a:p>
+            <a:fld id="{CEFFDB57-1E66-47D6-A1CA-F724767A65F8}" type="slidenum">
+              <a:rPr lang="en-GB" smtClean="0"/>
+              <a:t>‹#›</a:t>
+            </a:fld>
+            <a:endParaRPr lang="en-GB"/>
+          </a:p>
+        </p:txBody>
+      </p:sp>
+    </p:spTree>
+    <p:extLst>
+      <p:ext uri="{BB962C8B-B14F-4D97-AF65-F5344CB8AC3E}">
+        <p14:creationId xmlns:p14="http://schemas.microsoft.com/office/powerpoint/2010/main" val="1241856902"/>
+      </p:ext>
+    </p:extLst>
+  </p:cSld>
+  <p:clrMap bg1="lt1" tx1="dk1" bg2="lt2" tx2="dk2" accent1="accent1" accent2="accent2" accent3="accent3" accent4="accent4" accent5="accent5" accent6="accent6" hlink="hlink" folHlink="folHlink"/>
+  <p:notesStyle>
+    <a:lvl1pPr marL="0" algn="l" defTabSz="914400" rtl="0" eaLnBrk="1" latinLnBrk="0" hangingPunct="1">
+      <a:defRPr sz="1200" kern="1200">
+        <a:solidFill>
+          <a:schemeClr val="tx1"/>
+        </a:solidFill>
+        <a:latin typeface="+mn-lt"/>
+        <a:ea typeface="+mn-ea"/>
+        <a:cs typeface="+mn-cs"/>
+      </a:defRPr>
+    </a:lvl1pPr>
+    <a:lvl2pPr marL="457200" algn="l" defTabSz="914400" rtl="0" eaLnBrk="1" latinLnBrk="0" hangingPunct="1">
+      <a:defRPr sz="1200" kern="1200">
+        <a:solidFill>
+          <a:schemeClr val="tx1"/>
+        </a:solidFill>
+        <a:latin typeface="+mn-lt"/>
+        <a:ea typeface="+mn-ea"/>
+        <a:cs typeface="+mn-cs"/>
+      </a:defRPr>
+    </a:lvl2pPr>
+    <a:lvl3pPr marL="914400" algn="l" defTabSz="914400" rtl="0" eaLnBrk="1" latinLnBrk="0" hangingPunct="1">
+      <a:defRPr sz="1200" kern="1200">
+        <a:solidFill>
+          <a:schemeClr val="tx1"/>
+        </a:solidFill>
+        <a:latin typeface="+mn-lt"/>
+        <a:ea typeface="+mn-ea"/>
+        <a:cs typeface="+mn-cs"/>
+      </a:defRPr>
+    </a:lvl3pPr>
+    <a:lvl4pPr marL="1371600" algn="l" defTabSz="914400" rtl="0" eaLnBrk="1" latinLnBrk="0" hangingPunct="1">
+      <a:defRPr sz="1200" kern="1200">
+        <a:solidFill>
+          <a:schemeClr val="tx1"/>
+        </a:solidFill>
+        <a:latin typeface="+mn-lt"/>
+        <a:ea typeface="+mn-ea"/>
+        <a:cs typeface="+mn-cs"/>
+      </a:defRPr>
+    </a:lvl4pPr>
+    <a:lvl5pPr marL="1828800" algn="l" defTabSz="914400" rtl="0" eaLnBrk="1" latinLnBrk="0" hangingPunct="1">
+      <a:defRPr sz="1200" kern="1200">
+        <a:solidFill>
+          <a:schemeClr val="tx1"/>
+        </a:solidFill>
+        <a:latin typeface="+mn-lt"/>
+        <a:ea typeface="+mn-ea"/>
+        <a:cs typeface="+mn-cs"/>
+      </a:defRPr>
+    </a:lvl5pPr>
+    <a:lvl6pPr marL="2286000" algn="l" defTabSz="914400" rtl="0" eaLnBrk="1" latinLnBrk="0" hangingPunct="1">
+      <a:defRPr sz="1200" kern="1200">
+        <a:solidFill>
+          <a:schemeClr val="tx1"/>
+        </a:solidFill>
+        <a:latin typeface="+mn-lt"/>
+        <a:ea typeface="+mn-ea"/>
+        <a:cs typeface="+mn-cs"/>
+      </a:defRPr>
+    </a:lvl6pPr>
+    <a:lvl7pPr marL="2743200" algn="l" defTabSz="914400" rtl="0" eaLnBrk="1" latinLnBrk="0" hangingPunct="1">
+      <a:defRPr sz="1200" kern="1200">
+        <a:solidFill>
+          <a:schemeClr val="tx1"/>
+        </a:solidFill>
+        <a:latin typeface="+mn-lt"/>
+        <a:ea typeface="+mn-ea"/>
+        <a:cs typeface="+mn-cs"/>
+      </a:defRPr>
+    </a:lvl7pPr>
+    <a:lvl8pPr marL="3200400" algn="l" defTabSz="914400" rtl="0" eaLnBrk="1" latinLnBrk="0" hangingPunct="1">
+      <a:defRPr sz="1200" kern="1200">
+        <a:solidFill>
+          <a:schemeClr val="tx1"/>
+        </a:solidFill>
+        <a:latin typeface="+mn-lt"/>
+        <a:ea typeface="+mn-ea"/>
+        <a:cs typeface="+mn-cs"/>
+      </a:defRPr>
+    </a:lvl8pPr>
+    <a:lvl9pPr marL="3657600" algn="l" defTabSz="914400" rtl="0" eaLnBrk="1" latinLnBrk="0" hangingPunct="1">
+      <a:defRPr sz="1200" kern="1200">
+        <a:solidFill>
+          <a:schemeClr val="tx1"/>
+        </a:solidFill>
+        <a:latin typeface="+mn-lt"/>
+        <a:ea typeface="+mn-ea"/>
+        <a:cs typeface="+mn-cs"/>
+      </a:defRPr>
+    </a:lvl9pPr>
+  </p:notesStyle>
+</p:notesMaster>
+</file>
+
+<file path=ppt/notesSlides/notesSlide1.xml><?xml version="1.0" encoding="utf-8"?>
+<p:notes xmlns:a="http://schemas.openxmlformats.org/drawingml/2006/main" xmlns:r="http://schemas.openxmlformats.org/officeDocument/2006/relationships" xmlns:p="http://schemas.openxmlformats.org/presentationml/2006/main">
+  <p:cSld>
+    <p:spTree>
+      <p:nvGrpSpPr>
+        <p:cNvPr id="1" name=""/>
+        <p:cNvGrpSpPr/>
+        <p:nvPr/>
+      </p:nvGrpSpPr>
+      <p:grpSpPr>
+        <a:xfrm>
+          <a:off x="0" y="0"/>
+          <a:ext cx="0" cy="0"/>
+          <a:chOff x="0" y="0"/>
+          <a:chExt cx="0" cy="0"/>
+        </a:xfrm>
+      </p:grpSpPr>
+      <p:sp>
+        <p:nvSpPr>
+          <p:cNvPr id="2" name="Slide Image Placeholder 1"/>
+          <p:cNvSpPr>
+            <a:spLocks noGrp="1" noRot="1" noChangeAspect="1"/>
+          </p:cNvSpPr>
+          <p:nvPr>
+            <p:ph type="sldImg"/>
+          </p:nvPr>
+        </p:nvSpPr>
+        <p:spPr/>
+      </p:sp>
+      <p:sp>
+        <p:nvSpPr>
+          <p:cNvPr id="3" name="Notes Placeholder 2"/>
+          <p:cNvSpPr>
+            <a:spLocks noGrp="1"/>
+          </p:cNvSpPr>
+          <p:nvPr>
+            <p:ph type="body" idx="1"/>
+          </p:nvPr>
+        </p:nvSpPr>
+        <p:spPr/>
+        <p:txBody>
+          <a:bodyPr/>
+          <a:lstStyle/>
+          <a:p>
+            <a:endParaRPr lang="en-GB" dirty="0"/>
+          </a:p>
+        </p:txBody>
+      </p:sp>
+      <p:sp>
+        <p:nvSpPr>
+          <p:cNvPr id="4" name="Slide Number Placeholder 3"/>
+          <p:cNvSpPr>
+            <a:spLocks noGrp="1"/>
+          </p:cNvSpPr>
+          <p:nvPr>
+            <p:ph type="sldNum" sz="quarter" idx="5"/>
+          </p:nvPr>
+        </p:nvSpPr>
+        <p:spPr/>
+        <p:txBody>
+          <a:bodyPr/>
+          <a:lstStyle/>
+          <a:p>
+            <a:fld id="{CEFFDB57-1E66-47D6-A1CA-F724767A65F8}" type="slidenum">
+              <a:rPr lang="en-GB" smtClean="0"/>
+              <a:t>5</a:t>
+            </a:fld>
+            <a:endParaRPr lang="en-GB"/>
+          </a:p>
+        </p:txBody>
+      </p:sp>
+    </p:spTree>
+    <p:extLst>
+      <p:ext uri="{BB962C8B-B14F-4D97-AF65-F5344CB8AC3E}">
+        <p14:creationId xmlns:p14="http://schemas.microsoft.com/office/powerpoint/2010/main" val="15243170"/>
+      </p:ext>
+    </p:extLst>
+  </p:cSld>
+  <p:clrMapOvr>
+    <a:masterClrMapping/>
+  </p:clrMapOvr>
+</p:notes>
+</file>
+
 <file path=ppt/slideLayouts/slideLayout1.xml><?xml version="1.0" encoding="utf-8"?>
 <p:sldLayout xmlns:a="http://schemas.openxmlformats.org/drawingml/2006/main" xmlns:r="http://schemas.openxmlformats.org/officeDocument/2006/relationships" xmlns:p="http://schemas.openxmlformats.org/presentationml/2006/main" type="title" preserve="1">
   <p:cSld name="Title Slide">
@@ -266,7 +703,7 @@
           <a:p>
             <a:fld id="{CCA5D086-41C3-45A3-9AA5-B506825A19E0}" type="datetimeFigureOut">
               <a:rPr lang="en-GB" smtClean="0"/>
-              <a:t>05/12/2025</a:t>
+              <a:t>15/12/2025</a:t>
             </a:fld>
             <a:endParaRPr lang="en-GB"/>
           </a:p>
@@ -466,7 +903,7 @@
           <a:p>
             <a:fld id="{CCA5D086-41C3-45A3-9AA5-B506825A19E0}" type="datetimeFigureOut">
               <a:rPr lang="en-GB" smtClean="0"/>
-              <a:t>05/12/2025</a:t>
+              <a:t>15/12/2025</a:t>
             </a:fld>
             <a:endParaRPr lang="en-GB"/>
           </a:p>
@@ -676,7 +1113,7 @@
           <a:p>
             <a:fld id="{CCA5D086-41C3-45A3-9AA5-B506825A19E0}" type="datetimeFigureOut">
               <a:rPr lang="en-GB" smtClean="0"/>
-              <a:t>05/12/2025</a:t>
+              <a:t>15/12/2025</a:t>
             </a:fld>
             <a:endParaRPr lang="en-GB"/>
           </a:p>
@@ -876,7 +1313,7 @@
           <a:p>
             <a:fld id="{CCA5D086-41C3-45A3-9AA5-B506825A19E0}" type="datetimeFigureOut">
               <a:rPr lang="en-GB" smtClean="0"/>
-              <a:t>05/12/2025</a:t>
+              <a:t>15/12/2025</a:t>
             </a:fld>
             <a:endParaRPr lang="en-GB"/>
           </a:p>
@@ -1152,7 +1589,7 @@
           <a:p>
             <a:fld id="{CCA5D086-41C3-45A3-9AA5-B506825A19E0}" type="datetimeFigureOut">
               <a:rPr lang="en-GB" smtClean="0"/>
-              <a:t>05/12/2025</a:t>
+              <a:t>15/12/2025</a:t>
             </a:fld>
             <a:endParaRPr lang="en-GB"/>
           </a:p>
@@ -1420,7 +1857,7 @@
           <a:p>
             <a:fld id="{CCA5D086-41C3-45A3-9AA5-B506825A19E0}" type="datetimeFigureOut">
               <a:rPr lang="en-GB" smtClean="0"/>
-              <a:t>05/12/2025</a:t>
+              <a:t>15/12/2025</a:t>
             </a:fld>
             <a:endParaRPr lang="en-GB"/>
           </a:p>
@@ -1835,7 +2272,7 @@
           <a:p>
             <a:fld id="{CCA5D086-41C3-45A3-9AA5-B506825A19E0}" type="datetimeFigureOut">
               <a:rPr lang="en-GB" smtClean="0"/>
-              <a:t>05/12/2025</a:t>
+              <a:t>15/12/2025</a:t>
             </a:fld>
             <a:endParaRPr lang="en-GB"/>
           </a:p>
@@ -1977,7 +2414,7 @@
           <a:p>
             <a:fld id="{CCA5D086-41C3-45A3-9AA5-B506825A19E0}" type="datetimeFigureOut">
               <a:rPr lang="en-GB" smtClean="0"/>
-              <a:t>05/12/2025</a:t>
+              <a:t>15/12/2025</a:t>
             </a:fld>
             <a:endParaRPr lang="en-GB"/>
           </a:p>
@@ -2090,7 +2527,7 @@
           <a:p>
             <a:fld id="{CCA5D086-41C3-45A3-9AA5-B506825A19E0}" type="datetimeFigureOut">
               <a:rPr lang="en-GB" smtClean="0"/>
-              <a:t>05/12/2025</a:t>
+              <a:t>15/12/2025</a:t>
             </a:fld>
             <a:endParaRPr lang="en-GB"/>
           </a:p>
@@ -2403,7 +2840,7 @@
           <a:p>
             <a:fld id="{CCA5D086-41C3-45A3-9AA5-B506825A19E0}" type="datetimeFigureOut">
               <a:rPr lang="en-GB" smtClean="0"/>
-              <a:t>05/12/2025</a:t>
+              <a:t>15/12/2025</a:t>
             </a:fld>
             <a:endParaRPr lang="en-GB"/>
           </a:p>
@@ -2692,7 +3129,7 @@
           <a:p>
             <a:fld id="{CCA5D086-41C3-45A3-9AA5-B506825A19E0}" type="datetimeFigureOut">
               <a:rPr lang="en-GB" smtClean="0"/>
-              <a:t>05/12/2025</a:t>
+              <a:t>15/12/2025</a:t>
             </a:fld>
             <a:endParaRPr lang="en-GB"/>
           </a:p>
@@ -2935,7 +3372,7 @@
           <a:p>
             <a:fld id="{CCA5D086-41C3-45A3-9AA5-B506825A19E0}" type="datetimeFigureOut">
               <a:rPr lang="en-GB" smtClean="0"/>
-              <a:t>05/12/2025</a:t>
+              <a:t>15/12/2025</a:t>
             </a:fld>
             <a:endParaRPr lang="en-GB"/>
           </a:p>
@@ -5714,10 +6151,10 @@
       </p:grpSpPr>
       <p:pic>
         <p:nvPicPr>
-          <p:cNvPr id="6" name="Picture 5">
-            <a:extLst>
-              <a:ext uri="{FF2B5EF4-FFF2-40B4-BE49-F238E27FC236}">
-                <a16:creationId xmlns:a16="http://schemas.microsoft.com/office/drawing/2014/main" id="{CFC4D49F-E8EA-6260-F122-6575298E7F0C}"/>
+          <p:cNvPr id="7" name="Picture 6">
+            <a:extLst>
+              <a:ext uri="{FF2B5EF4-FFF2-40B4-BE49-F238E27FC236}">
+                <a16:creationId xmlns:a16="http://schemas.microsoft.com/office/drawing/2014/main" id="{07EDD37E-9FB7-7BEE-1591-30058E38C018}"/>
               </a:ext>
             </a:extLst>
           </p:cNvPr>
@@ -5727,15 +6164,15 @@
           <p:nvPr/>
         </p:nvPicPr>
         <p:blipFill>
-          <a:blip r:embed="rId2"/>
+          <a:blip r:embed="rId3"/>
           <a:stretch>
             <a:fillRect/>
           </a:stretch>
         </p:blipFill>
         <p:spPr>
           <a:xfrm>
-            <a:off x="316089" y="327864"/>
-            <a:ext cx="4375087" cy="3240000"/>
+            <a:off x="292428" y="386514"/>
+            <a:ext cx="4373599" cy="3181350"/>
           </a:xfrm>
           <a:prstGeom prst="rect">
             <a:avLst/>
@@ -5757,7 +6194,7 @@
           <p:nvPr/>
         </p:nvPicPr>
         <p:blipFill>
-          <a:blip r:embed="rId3"/>
+          <a:blip r:embed="rId4"/>
           <a:stretch>
             <a:fillRect/>
           </a:stretch>
@@ -5787,7 +6224,7 @@
           <p:nvPr/>
         </p:nvPicPr>
         <p:blipFill>
-          <a:blip r:embed="rId4"/>
+          <a:blip r:embed="rId5"/>
           <a:stretch>
             <a:fillRect/>
           </a:stretch>
@@ -5817,7 +6254,7 @@
           <p:nvPr/>
         </p:nvPicPr>
         <p:blipFill>
-          <a:blip r:embed="rId5"/>
+          <a:blip r:embed="rId6"/>
           <a:stretch>
             <a:fillRect/>
           </a:stretch>
@@ -5847,7 +6284,7 @@
           <p:nvPr/>
         </p:nvPicPr>
         <p:blipFill>
-          <a:blip r:embed="rId6"/>
+          <a:blip r:embed="rId7"/>
           <a:stretch>
             <a:fillRect/>
           </a:stretch>
@@ -5981,6 +6418,81 @@
             <a:r>
               <a:rPr lang="en-GB" dirty="0"/>
               <a:t>LDA spaghetti</a:t>
+            </a:r>
+          </a:p>
+        </p:txBody>
+      </p:sp>
+      <p:pic>
+        <p:nvPicPr>
+          <p:cNvPr id="4" name="Picture 3">
+            <a:extLst>
+              <a:ext uri="{FF2B5EF4-FFF2-40B4-BE49-F238E27FC236}">
+                <a16:creationId xmlns:a16="http://schemas.microsoft.com/office/drawing/2014/main" id="{B2012F25-708D-D22F-9D93-D97C03B174CE}"/>
+              </a:ext>
+            </a:extLst>
+          </p:cNvPr>
+          <p:cNvPicPr>
+            <a:picLocks noChangeAspect="1"/>
+          </p:cNvPicPr>
+          <p:nvPr/>
+        </p:nvPicPr>
+        <p:blipFill>
+          <a:blip r:embed="rId8"/>
+          <a:stretch>
+            <a:fillRect/>
+          </a:stretch>
+        </p:blipFill>
+        <p:spPr>
+          <a:xfrm>
+            <a:off x="8789337" y="512530"/>
+            <a:ext cx="3363500" cy="2814870"/>
+          </a:xfrm>
+          <a:prstGeom prst="rect">
+            <a:avLst/>
+          </a:prstGeom>
+        </p:spPr>
+      </p:pic>
+      <p:sp>
+        <p:nvSpPr>
+          <p:cNvPr id="9" name="TextBox 8">
+            <a:extLst>
+              <a:ext uri="{FF2B5EF4-FFF2-40B4-BE49-F238E27FC236}">
+                <a16:creationId xmlns:a16="http://schemas.microsoft.com/office/drawing/2014/main" id="{2F5EF315-B90C-B4A5-6F22-6F88913649D1}"/>
+              </a:ext>
+            </a:extLst>
+          </p:cNvPr>
+          <p:cNvSpPr txBox="1"/>
+          <p:nvPr/>
+        </p:nvSpPr>
+        <p:spPr>
+          <a:xfrm>
+            <a:off x="9245600" y="3371850"/>
+            <a:ext cx="2514022" cy="646331"/>
+          </a:xfrm>
+          <a:prstGeom prst="rect">
+            <a:avLst/>
+          </a:prstGeom>
+          <a:noFill/>
+        </p:spPr>
+        <p:txBody>
+          <a:bodyPr wrap="none" rtlCol="0">
+            <a:spAutoFit/>
+          </a:bodyPr>
+          <a:lstStyle/>
+          <a:p>
+            <a:r>
+              <a:rPr lang="en-GB"/>
+              <a:t>Linear spin </a:t>
+            </a:r>
+            <a:r>
+              <a:rPr lang="en-GB" dirty="0"/>
+              <a:t>wave theory</a:t>
+            </a:r>
+          </a:p>
+          <a:p>
+            <a:r>
+              <a:rPr lang="en-GB" dirty="0"/>
+              <a:t>fitting</a:t>
             </a:r>
           </a:p>
         </p:txBody>
@@ -6442,4 +6954,319 @@
     </a:ext>
   </a:extLst>
 </a:theme>
+</file>
+
+<file path=ppt/theme/theme2.xml><?xml version="1.0" encoding="utf-8"?>
+<a:theme xmlns:a="http://schemas.openxmlformats.org/drawingml/2006/main" name="Office Theme">
+  <a:themeElements>
+    <a:clrScheme name="Office">
+      <a:dk1>
+        <a:sysClr val="windowText" lastClr="000000"/>
+      </a:dk1>
+      <a:lt1>
+        <a:sysClr val="window" lastClr="FFFFFF"/>
+      </a:lt1>
+      <a:dk2>
+        <a:srgbClr val="0E2841"/>
+      </a:dk2>
+      <a:lt2>
+        <a:srgbClr val="E8E8E8"/>
+      </a:lt2>
+      <a:accent1>
+        <a:srgbClr val="156082"/>
+      </a:accent1>
+      <a:accent2>
+        <a:srgbClr val="E97132"/>
+      </a:accent2>
+      <a:accent3>
+        <a:srgbClr val="196B24"/>
+      </a:accent3>
+      <a:accent4>
+        <a:srgbClr val="0F9ED5"/>
+      </a:accent4>
+      <a:accent5>
+        <a:srgbClr val="A02B93"/>
+      </a:accent5>
+      <a:accent6>
+        <a:srgbClr val="4EA72E"/>
+      </a:accent6>
+      <a:hlink>
+        <a:srgbClr val="467886"/>
+      </a:hlink>
+      <a:folHlink>
+        <a:srgbClr val="96607D"/>
+      </a:folHlink>
+    </a:clrScheme>
+    <a:fontScheme name="Office">
+      <a:majorFont>
+        <a:latin typeface="Aptos Display" panose="02110004020202020204"/>
+        <a:ea typeface=""/>
+        <a:cs typeface=""/>
+        <a:font script="Jpan" typeface="游ゴシック Light"/>
+        <a:font script="Hang" typeface="맑은 고딕"/>
+        <a:font script="Hans" typeface="等线 Light"/>
+        <a:font script="Hant" typeface="新細明體"/>
+        <a:font script="Arab" typeface="Times New Roman"/>
+        <a:font script="Hebr" typeface="Times New Roman"/>
+        <a:font script="Thai" typeface="Angsana New"/>
+        <a:font script="Ethi" typeface="Nyala"/>
+        <a:font script="Beng" typeface="Vrinda"/>
+        <a:font script="Gujr" typeface="Shruti"/>
+        <a:font script="Khmr" typeface="MoolBoran"/>
+        <a:font script="Knda" typeface="Tunga"/>
+        <a:font script="Guru" typeface="Raavi"/>
+        <a:font script="Cans" typeface="Euphemia"/>
+        <a:font script="Cher" typeface="Plantagenet Cherokee"/>
+        <a:font script="Yiii" typeface="Microsoft Yi Baiti"/>
+        <a:font script="Tibt" typeface="Microsoft Himalaya"/>
+        <a:font script="Thaa" typeface="MV Boli"/>
+        <a:font script="Deva" typeface="Mangal"/>
+        <a:font script="Telu" typeface="Gautami"/>
+        <a:font script="Taml" typeface="Latha"/>
+        <a:font script="Syrc" typeface="Estrangelo Edessa"/>
+        <a:font script="Orya" typeface="Kalinga"/>
+        <a:font script="Mlym" typeface="Kartika"/>
+        <a:font script="Laoo" typeface="DokChampa"/>
+        <a:font script="Sinh" typeface="Iskoola Pota"/>
+        <a:font script="Mong" typeface="Mongolian Baiti"/>
+        <a:font script="Viet" typeface="Times New Roman"/>
+        <a:font script="Uigh" typeface="Microsoft Uighur"/>
+        <a:font script="Geor" typeface="Sylfaen"/>
+        <a:font script="Armn" typeface="Arial"/>
+        <a:font script="Bugi" typeface="Leelawadee UI"/>
+        <a:font script="Bopo" typeface="Microsoft JhengHei"/>
+        <a:font script="Java" typeface="Javanese Text"/>
+        <a:font script="Lisu" typeface="Segoe UI"/>
+        <a:font script="Mymr" typeface="Myanmar Text"/>
+        <a:font script="Nkoo" typeface="Ebrima"/>
+        <a:font script="Olck" typeface="Nirmala UI"/>
+        <a:font script="Osma" typeface="Ebrima"/>
+        <a:font script="Phag" typeface="Phagspa"/>
+        <a:font script="Syrn" typeface="Estrangelo Edessa"/>
+        <a:font script="Syrj" typeface="Estrangelo Edessa"/>
+        <a:font script="Syre" typeface="Estrangelo Edessa"/>
+        <a:font script="Sora" typeface="Nirmala UI"/>
+        <a:font script="Tale" typeface="Microsoft Tai Le"/>
+        <a:font script="Talu" typeface="Microsoft New Tai Lue"/>
+        <a:font script="Tfng" typeface="Ebrima"/>
+      </a:majorFont>
+      <a:minorFont>
+        <a:latin typeface="Aptos" panose="02110004020202020204"/>
+        <a:ea typeface=""/>
+        <a:cs typeface=""/>
+        <a:font script="Jpan" typeface="游ゴシック"/>
+        <a:font script="Hang" typeface="맑은 고딕"/>
+        <a:font script="Hans" typeface="等线"/>
+        <a:font script="Hant" typeface="新細明體"/>
+        <a:font script="Arab" typeface="Arial"/>
+        <a:font script="Hebr" typeface="Arial"/>
+        <a:font script="Thai" typeface="Cordia New"/>
+        <a:font script="Ethi" typeface="Nyala"/>
+        <a:font script="Beng" typeface="Vrinda"/>
+        <a:font script="Gujr" typeface="Shruti"/>
+        <a:font script="Khmr" typeface="DaunPenh"/>
+        <a:font script="Knda" typeface="Tunga"/>
+        <a:font script="Guru" typeface="Raavi"/>
+        <a:font script="Cans" typeface="Euphemia"/>
+        <a:font script="Cher" typeface="Plantagenet Cherokee"/>
+        <a:font script="Yiii" typeface="Microsoft Yi Baiti"/>
+        <a:font script="Tibt" typeface="Microsoft Himalaya"/>
+        <a:font script="Thaa" typeface="MV Boli"/>
+        <a:font script="Deva" typeface="Mangal"/>
+        <a:font script="Telu" typeface="Gautami"/>
+        <a:font script="Taml" typeface="Latha"/>
+        <a:font script="Syrc" typeface="Estrangelo Edessa"/>
+        <a:font script="Orya" typeface="Kalinga"/>
+        <a:font script="Mlym" typeface="Kartika"/>
+        <a:font script="Laoo" typeface="DokChampa"/>
+        <a:font script="Sinh" typeface="Iskoola Pota"/>
+        <a:font script="Mong" typeface="Mongolian Baiti"/>
+        <a:font script="Viet" typeface="Arial"/>
+        <a:font script="Uigh" typeface="Microsoft Uighur"/>
+        <a:font script="Geor" typeface="Sylfaen"/>
+        <a:font script="Armn" typeface="Arial"/>
+        <a:font script="Bugi" typeface="Leelawadee UI"/>
+        <a:font script="Bopo" typeface="Microsoft JhengHei"/>
+        <a:font script="Java" typeface="Javanese Text"/>
+        <a:font script="Lisu" typeface="Segoe UI"/>
+        <a:font script="Mymr" typeface="Myanmar Text"/>
+        <a:font script="Nkoo" typeface="Ebrima"/>
+        <a:font script="Olck" typeface="Nirmala UI"/>
+        <a:font script="Osma" typeface="Ebrima"/>
+        <a:font script="Phag" typeface="Phagspa"/>
+        <a:font script="Syrn" typeface="Estrangelo Edessa"/>
+        <a:font script="Syrj" typeface="Estrangelo Edessa"/>
+        <a:font script="Syre" typeface="Estrangelo Edessa"/>
+        <a:font script="Sora" typeface="Nirmala UI"/>
+        <a:font script="Tale" typeface="Microsoft Tai Le"/>
+        <a:font script="Talu" typeface="Microsoft New Tai Lue"/>
+        <a:font script="Tfng" typeface="Ebrima"/>
+      </a:minorFont>
+    </a:fontScheme>
+    <a:fmtScheme name="Office">
+      <a:fillStyleLst>
+        <a:solidFill>
+          <a:schemeClr val="phClr"/>
+        </a:solidFill>
+        <a:gradFill rotWithShape="1">
+          <a:gsLst>
+            <a:gs pos="0">
+              <a:schemeClr val="phClr">
+                <a:lumMod val="110000"/>
+                <a:satMod val="105000"/>
+                <a:tint val="67000"/>
+              </a:schemeClr>
+            </a:gs>
+            <a:gs pos="50000">
+              <a:schemeClr val="phClr">
+                <a:lumMod val="105000"/>
+                <a:satMod val="103000"/>
+                <a:tint val="73000"/>
+              </a:schemeClr>
+            </a:gs>
+            <a:gs pos="100000">
+              <a:schemeClr val="phClr">
+                <a:lumMod val="105000"/>
+                <a:satMod val="109000"/>
+                <a:tint val="81000"/>
+              </a:schemeClr>
+            </a:gs>
+          </a:gsLst>
+          <a:lin ang="5400000" scaled="0"/>
+        </a:gradFill>
+        <a:gradFill rotWithShape="1">
+          <a:gsLst>
+            <a:gs pos="0">
+              <a:schemeClr val="phClr">
+                <a:satMod val="103000"/>
+                <a:lumMod val="102000"/>
+                <a:tint val="94000"/>
+              </a:schemeClr>
+            </a:gs>
+            <a:gs pos="50000">
+              <a:schemeClr val="phClr">
+                <a:satMod val="110000"/>
+                <a:lumMod val="100000"/>
+                <a:shade val="100000"/>
+              </a:schemeClr>
+            </a:gs>
+            <a:gs pos="100000">
+              <a:schemeClr val="phClr">
+                <a:lumMod val="99000"/>
+                <a:satMod val="120000"/>
+                <a:shade val="78000"/>
+              </a:schemeClr>
+            </a:gs>
+          </a:gsLst>
+          <a:lin ang="5400000" scaled="0"/>
+        </a:gradFill>
+      </a:fillStyleLst>
+      <a:lnStyleLst>
+        <a:ln w="12700" cap="flat" cmpd="sng" algn="ctr">
+          <a:solidFill>
+            <a:schemeClr val="phClr"/>
+          </a:solidFill>
+          <a:prstDash val="solid"/>
+          <a:miter lim="800000"/>
+        </a:ln>
+        <a:ln w="19050" cap="flat" cmpd="sng" algn="ctr">
+          <a:solidFill>
+            <a:schemeClr val="phClr"/>
+          </a:solidFill>
+          <a:prstDash val="solid"/>
+          <a:miter lim="800000"/>
+        </a:ln>
+        <a:ln w="25400" cap="flat" cmpd="sng" algn="ctr">
+          <a:solidFill>
+            <a:schemeClr val="phClr"/>
+          </a:solidFill>
+          <a:prstDash val="solid"/>
+          <a:miter lim="800000"/>
+        </a:ln>
+      </a:lnStyleLst>
+      <a:effectStyleLst>
+        <a:effectStyle>
+          <a:effectLst/>
+        </a:effectStyle>
+        <a:effectStyle>
+          <a:effectLst/>
+        </a:effectStyle>
+        <a:effectStyle>
+          <a:effectLst>
+            <a:outerShdw blurRad="57150" dist="19050" dir="5400000" algn="ctr" rotWithShape="0">
+              <a:srgbClr val="000000">
+                <a:alpha val="63000"/>
+              </a:srgbClr>
+            </a:outerShdw>
+          </a:effectLst>
+        </a:effectStyle>
+      </a:effectStyleLst>
+      <a:bgFillStyleLst>
+        <a:solidFill>
+          <a:schemeClr val="phClr"/>
+        </a:solidFill>
+        <a:solidFill>
+          <a:schemeClr val="phClr">
+            <a:tint val="95000"/>
+            <a:satMod val="170000"/>
+          </a:schemeClr>
+        </a:solidFill>
+        <a:gradFill rotWithShape="1">
+          <a:gsLst>
+            <a:gs pos="0">
+              <a:schemeClr val="phClr">
+                <a:tint val="93000"/>
+                <a:satMod val="150000"/>
+                <a:shade val="98000"/>
+                <a:lumMod val="102000"/>
+              </a:schemeClr>
+            </a:gs>
+            <a:gs pos="50000">
+              <a:schemeClr val="phClr">
+                <a:tint val="98000"/>
+                <a:satMod val="130000"/>
+                <a:shade val="90000"/>
+                <a:lumMod val="103000"/>
+              </a:schemeClr>
+            </a:gs>
+            <a:gs pos="100000">
+              <a:schemeClr val="phClr">
+                <a:shade val="63000"/>
+                <a:satMod val="120000"/>
+              </a:schemeClr>
+            </a:gs>
+          </a:gsLst>
+          <a:lin ang="5400000" scaled="0"/>
+        </a:gradFill>
+      </a:bgFillStyleLst>
+    </a:fmtScheme>
+  </a:themeElements>
+  <a:objectDefaults>
+    <a:lnDef>
+      <a:spPr/>
+      <a:bodyPr/>
+      <a:lstStyle/>
+      <a:style>
+        <a:lnRef idx="2">
+          <a:schemeClr val="accent1"/>
+        </a:lnRef>
+        <a:fillRef idx="0">
+          <a:schemeClr val="accent1"/>
+        </a:fillRef>
+        <a:effectRef idx="1">
+          <a:schemeClr val="accent1"/>
+        </a:effectRef>
+        <a:fontRef idx="minor">
+          <a:schemeClr val="tx1"/>
+        </a:fontRef>
+      </a:style>
+    </a:lnDef>
+  </a:objectDefaults>
+  <a:extraClrSchemeLst/>
+  <a:extLst>
+    <a:ext uri="{05A4C25C-085E-4340-85A3-A5531E510DB2}">
+      <thm15:themeFamily xmlns:thm15="http://schemas.microsoft.com/office/thememl/2012/main" name="Office Theme" id="{2E142A2C-CD16-42D6-873A-C26D2A0506FA}" vid="{1BDDFF52-6CD6-40A5-AB3C-68EB2F1E4D0A}"/>
+    </a:ext>
+  </a:extLst>
+</a:theme>
 </file>
</xml_diff>